<commit_message>
Update Die biologischen Wirkungen radioaktiver Strahlung.pptx
</commit_message>
<xml_diff>
--- a/Präsentation/Die biologischen Wirkungen radioaktiver Strahlung.pptx
+++ b/Präsentation/Die biologischen Wirkungen radioaktiver Strahlung.pptx
@@ -5,10 +5,10 @@
     <p:sldMasterId id="2147483648" r:id="rId4"/>
   </p:sldMasterIdLst>
   <p:notesMasterIdLst>
-    <p:notesMasterId r:id="rId35"/>
+    <p:notesMasterId r:id="rId37"/>
   </p:notesMasterIdLst>
   <p:handoutMasterIdLst>
-    <p:handoutMasterId r:id="rId36"/>
+    <p:handoutMasterId r:id="rId38"/>
   </p:handoutMasterIdLst>
   <p:sldIdLst>
     <p:sldId id="279" r:id="rId5"/>
@@ -34,13 +34,15 @@
     <p:sldId id="282" r:id="rId25"/>
     <p:sldId id="275" r:id="rId26"/>
     <p:sldId id="298" r:id="rId27"/>
-    <p:sldId id="287" r:id="rId28"/>
-    <p:sldId id="283" r:id="rId29"/>
-    <p:sldId id="276" r:id="rId30"/>
-    <p:sldId id="299" r:id="rId31"/>
-    <p:sldId id="288" r:id="rId32"/>
-    <p:sldId id="289" r:id="rId33"/>
-    <p:sldId id="278" r:id="rId34"/>
+    <p:sldId id="302" r:id="rId28"/>
+    <p:sldId id="287" r:id="rId29"/>
+    <p:sldId id="283" r:id="rId30"/>
+    <p:sldId id="276" r:id="rId31"/>
+    <p:sldId id="299" r:id="rId32"/>
+    <p:sldId id="288" r:id="rId33"/>
+    <p:sldId id="289" r:id="rId34"/>
+    <p:sldId id="278" r:id="rId35"/>
+    <p:sldId id="303" r:id="rId36"/>
   </p:sldIdLst>
   <p:sldSz cx="12192000" cy="6858000"/>
   <p:notesSz cx="6858000" cy="9144000"/>
@@ -167,6 +169,7 @@
             <p14:sldId id="282"/>
             <p14:sldId id="275"/>
             <p14:sldId id="298"/>
+            <p14:sldId id="302"/>
             <p14:sldId id="287"/>
             <p14:sldId id="283"/>
             <p14:sldId id="276"/>
@@ -174,6 +177,7 @@
             <p14:sldId id="288"/>
             <p14:sldId id="289"/>
             <p14:sldId id="278"/>
+            <p14:sldId id="303"/>
           </p14:sldIdLst>
         </p14:section>
       </p14:sectionLst>
@@ -3524,7 +3528,7 @@
           <a:p>
             <a:fld id="{B56F32FC-4BD9-442A-A8C6-51598C909FE3}" type="datetimeFigureOut">
               <a:rPr lang="en-US" smtClean="0"/>
-              <a:t>11/29/2023</a:t>
+              <a:t>12/1/2023</a:t>
             </a:fld>
             <a:endParaRPr lang="en-US" dirty="0"/>
           </a:p>
@@ -3602,7 +3606,7 @@
           <a:p>
             <a:fld id="{28EEFA9E-C190-4F5C-8394-BD5F1CD55C02}" type="slidenum">
               <a:rPr lang="en-US" smtClean="0"/>
-              <a:t>‹#›</a:t>
+              <a:t>‹Nr.›</a:t>
             </a:fld>
             <a:endParaRPr lang="en-US" dirty="0"/>
           </a:p>
@@ -3701,7 +3705,7 @@
           <a:p>
             <a:fld id="{056371FA-A98D-41E8-93F4-09945841298A}" type="datetimeFigureOut">
               <a:rPr lang="en-US" smtClean="0"/>
-              <a:t>11/29/2023</a:t>
+              <a:t>12/1/2023</a:t>
             </a:fld>
             <a:endParaRPr lang="en-US" dirty="0"/>
           </a:p>
@@ -3859,7 +3863,7 @@
           <a:p>
             <a:fld id="{22289C57-55D7-40A4-A101-E74FAC7A092B}" type="slidenum">
               <a:rPr lang="en-US" smtClean="0"/>
-              <a:t>‹#›</a:t>
+              <a:t>‹Nr.›</a:t>
             </a:fld>
             <a:endParaRPr lang="en-US" dirty="0"/>
           </a:p>
@@ -4170,13 +4174,13 @@
   <p:clrMapOvr>
     <a:masterClrMapping/>
   </p:clrMapOvr>
-  <mc:AlternateContent xmlns:mc="http://schemas.openxmlformats.org/markup-compatibility/2006">
-    <mc:Choice xmlns:p159="http://schemas.microsoft.com/office/powerpoint/2015/09/main" Requires="p159">
+  <mc:AlternateContent xmlns:mc="http://schemas.openxmlformats.org/markup-compatibility/2006" xmlns:p159="http://schemas.microsoft.com/office/powerpoint/2015/09/main">
+    <mc:Choice Requires="p159">
       <p:transition xmlns:p14="http://schemas.microsoft.com/office/powerpoint/2010/main" spd="slow" p14:dur="1500">
         <p159:morph option="byWord"/>
       </p:transition>
     </mc:Choice>
-    <mc:Fallback>
+    <mc:Fallback xmlns="">
       <p:transition spd="slow">
         <p:fade/>
       </p:transition>
@@ -4484,7 +4488,7 @@
             <a:fld id="{A49DFD55-3C28-40EF-9E31-A92D2E4017FF}" type="slidenum">
               <a:rPr lang="en-US" smtClean="0"/>
               <a:pPr/>
-              <a:t>‹#›</a:t>
+              <a:t>‹Nr.›</a:t>
             </a:fld>
             <a:endParaRPr lang="en-US" dirty="0"/>
           </a:p>
@@ -4500,13 +4504,13 @@
   <p:clrMapOvr>
     <a:overrideClrMapping bg1="lt1" tx1="dk1" bg2="lt2" tx2="dk2" accent1="accent1" accent2="accent2" accent3="accent3" accent4="accent4" accent5="accent5" accent6="accent6" hlink="hlink" folHlink="folHlink"/>
   </p:clrMapOvr>
-  <mc:AlternateContent xmlns:mc="http://schemas.openxmlformats.org/markup-compatibility/2006">
-    <mc:Choice xmlns:p159="http://schemas.microsoft.com/office/powerpoint/2015/09/main" Requires="p159">
+  <mc:AlternateContent xmlns:mc="http://schemas.openxmlformats.org/markup-compatibility/2006" xmlns:p159="http://schemas.microsoft.com/office/powerpoint/2015/09/main">
+    <mc:Choice Requires="p159">
       <p:transition xmlns:p14="http://schemas.microsoft.com/office/powerpoint/2010/main" spd="slow" p14:dur="1500">
         <p159:morph option="byWord"/>
       </p:transition>
     </mc:Choice>
-    <mc:Fallback>
+    <mc:Fallback xmlns="">
       <p:transition spd="slow">
         <p:fade/>
       </p:transition>
@@ -5107,7 +5111,7 @@
             <a:fld id="{A49DFD55-3C28-40EF-9E31-A92D2E4017FF}" type="slidenum">
               <a:rPr lang="en-US" smtClean="0"/>
               <a:pPr/>
-              <a:t>‹#›</a:t>
+              <a:t>‹Nr.›</a:t>
             </a:fld>
             <a:endParaRPr lang="en-US" dirty="0"/>
           </a:p>
@@ -5307,13 +5311,13 @@
   <p:clrMapOvr>
     <a:masterClrMapping/>
   </p:clrMapOvr>
-  <mc:AlternateContent xmlns:mc="http://schemas.openxmlformats.org/markup-compatibility/2006">
-    <mc:Choice xmlns:p159="http://schemas.microsoft.com/office/powerpoint/2015/09/main" Requires="p159">
+  <mc:AlternateContent xmlns:mc="http://schemas.openxmlformats.org/markup-compatibility/2006" xmlns:p159="http://schemas.microsoft.com/office/powerpoint/2015/09/main">
+    <mc:Choice Requires="p159">
       <p:transition xmlns:p14="http://schemas.microsoft.com/office/powerpoint/2010/main" spd="slow" p14:dur="1500">
         <p159:morph option="byWord"/>
       </p:transition>
     </mc:Choice>
-    <mc:Fallback>
+    <mc:Fallback xmlns="">
       <p:transition spd="slow">
         <p:fade/>
       </p:transition>
@@ -5854,7 +5858,7 @@
             <a:fld id="{A49DFD55-3C28-40EF-9E31-A92D2E4017FF}" type="slidenum">
               <a:rPr lang="en-US" smtClean="0"/>
               <a:pPr/>
-              <a:t>‹#›</a:t>
+              <a:t>‹Nr.›</a:t>
             </a:fld>
             <a:endParaRPr lang="en-US" dirty="0"/>
           </a:p>
@@ -5905,13 +5909,13 @@
   <p:clrMapOvr>
     <a:masterClrMapping/>
   </p:clrMapOvr>
-  <mc:AlternateContent xmlns:mc="http://schemas.openxmlformats.org/markup-compatibility/2006">
-    <mc:Choice xmlns:p159="http://schemas.microsoft.com/office/powerpoint/2015/09/main" Requires="p159">
+  <mc:AlternateContent xmlns:mc="http://schemas.openxmlformats.org/markup-compatibility/2006" xmlns:p159="http://schemas.microsoft.com/office/powerpoint/2015/09/main">
+    <mc:Choice Requires="p159">
       <p:transition xmlns:p14="http://schemas.microsoft.com/office/powerpoint/2010/main" spd="slow" p14:dur="1500">
         <p159:morph option="byWord"/>
       </p:transition>
     </mc:Choice>
-    <mc:Fallback>
+    <mc:Fallback xmlns="">
       <p:transition spd="slow">
         <p:fade/>
       </p:transition>
@@ -6630,7 +6634,7 @@
             <a:fld id="{A49DFD55-3C28-40EF-9E31-A92D2E4017FF}" type="slidenum">
               <a:rPr lang="en-US" smtClean="0"/>
               <a:pPr/>
-              <a:t>‹#›</a:t>
+              <a:t>‹Nr.›</a:t>
             </a:fld>
             <a:endParaRPr lang="en-US" dirty="0"/>
           </a:p>
@@ -6756,13 +6760,13 @@
   <p:clrMapOvr>
     <a:overrideClrMapping bg1="lt1" tx1="dk1" bg2="lt2" tx2="dk2" accent1="accent1" accent2="accent2" accent3="accent3" accent4="accent4" accent5="accent5" accent6="accent6" hlink="hlink" folHlink="folHlink"/>
   </p:clrMapOvr>
-  <mc:AlternateContent xmlns:mc="http://schemas.openxmlformats.org/markup-compatibility/2006">
-    <mc:Choice xmlns:p159="http://schemas.microsoft.com/office/powerpoint/2015/09/main" Requires="p159">
+  <mc:AlternateContent xmlns:mc="http://schemas.openxmlformats.org/markup-compatibility/2006" xmlns:p159="http://schemas.microsoft.com/office/powerpoint/2015/09/main">
+    <mc:Choice Requires="p159">
       <p:transition xmlns:p14="http://schemas.microsoft.com/office/powerpoint/2010/main" spd="slow" p14:dur="1500">
         <p159:morph option="byWord"/>
       </p:transition>
     </mc:Choice>
-    <mc:Fallback>
+    <mc:Fallback xmlns="">
       <p:transition spd="slow">
         <p:fade/>
       </p:transition>
@@ -7176,7 +7180,7 @@
             <a:fld id="{A49DFD55-3C28-40EF-9E31-A92D2E4017FF}" type="slidenum">
               <a:rPr lang="en-US" smtClean="0"/>
               <a:pPr/>
-              <a:t>‹#›</a:t>
+              <a:t>‹Nr.›</a:t>
             </a:fld>
             <a:endParaRPr lang="en-US" dirty="0"/>
           </a:p>
@@ -7192,13 +7196,13 @@
   <p:clrMapOvr>
     <a:masterClrMapping/>
   </p:clrMapOvr>
-  <mc:AlternateContent xmlns:mc="http://schemas.openxmlformats.org/markup-compatibility/2006">
-    <mc:Choice xmlns:p159="http://schemas.microsoft.com/office/powerpoint/2015/09/main" Requires="p159">
+  <mc:AlternateContent xmlns:mc="http://schemas.openxmlformats.org/markup-compatibility/2006" xmlns:p159="http://schemas.microsoft.com/office/powerpoint/2015/09/main">
+    <mc:Choice Requires="p159">
       <p:transition xmlns:p14="http://schemas.microsoft.com/office/powerpoint/2010/main" spd="slow" p14:dur="1500">
         <p159:morph option="byWord"/>
       </p:transition>
     </mc:Choice>
-    <mc:Fallback>
+    <mc:Fallback xmlns="">
       <p:transition spd="slow">
         <p:fade/>
       </p:transition>
@@ -7508,7 +7512,7 @@
             <a:fld id="{A49DFD55-3C28-40EF-9E31-A92D2E4017FF}" type="slidenum">
               <a:rPr lang="en-US" smtClean="0"/>
               <a:pPr/>
-              <a:t>‹#›</a:t>
+              <a:t>‹Nr.›</a:t>
             </a:fld>
             <a:endParaRPr lang="en-US" dirty="0"/>
           </a:p>
@@ -7524,13 +7528,13 @@
   <p:clrMapOvr>
     <a:masterClrMapping/>
   </p:clrMapOvr>
-  <mc:AlternateContent xmlns:mc="http://schemas.openxmlformats.org/markup-compatibility/2006">
-    <mc:Choice xmlns:p159="http://schemas.microsoft.com/office/powerpoint/2015/09/main" Requires="p159">
+  <mc:AlternateContent xmlns:mc="http://schemas.openxmlformats.org/markup-compatibility/2006" xmlns:p159="http://schemas.microsoft.com/office/powerpoint/2015/09/main">
+    <mc:Choice Requires="p159">
       <p:transition xmlns:p14="http://schemas.microsoft.com/office/powerpoint/2010/main" spd="slow" p14:dur="1500">
         <p159:morph option="byWord"/>
       </p:transition>
     </mc:Choice>
-    <mc:Fallback>
+    <mc:Fallback xmlns="">
       <p:transition spd="slow">
         <p:fade/>
       </p:transition>
@@ -7867,7 +7871,7 @@
             <a:fld id="{A49DFD55-3C28-40EF-9E31-A92D2E4017FF}" type="slidenum">
               <a:rPr lang="en-US" smtClean="0"/>
               <a:pPr/>
-              <a:t>‹#›</a:t>
+              <a:t>‹Nr.›</a:t>
             </a:fld>
             <a:endParaRPr lang="en-US" dirty="0"/>
           </a:p>
@@ -7883,13 +7887,13 @@
   <p:clrMapOvr>
     <a:masterClrMapping/>
   </p:clrMapOvr>
-  <mc:AlternateContent xmlns:mc="http://schemas.openxmlformats.org/markup-compatibility/2006">
-    <mc:Choice xmlns:p159="http://schemas.microsoft.com/office/powerpoint/2015/09/main" Requires="p159">
+  <mc:AlternateContent xmlns:mc="http://schemas.openxmlformats.org/markup-compatibility/2006" xmlns:p159="http://schemas.microsoft.com/office/powerpoint/2015/09/main">
+    <mc:Choice Requires="p159">
       <p:transition xmlns:p14="http://schemas.microsoft.com/office/powerpoint/2010/main" spd="slow" p14:dur="1500">
         <p159:morph option="byWord"/>
       </p:transition>
     </mc:Choice>
-    <mc:Fallback>
+    <mc:Fallback xmlns="">
       <p:transition spd="slow">
         <p:fade/>
       </p:transition>
@@ -8220,7 +8224,7 @@
             <a:fld id="{A49DFD55-3C28-40EF-9E31-A92D2E4017FF}" type="slidenum">
               <a:rPr lang="en-US" smtClean="0"/>
               <a:pPr/>
-              <a:t>‹#›</a:t>
+              <a:t>‹Nr.›</a:t>
             </a:fld>
             <a:endParaRPr lang="en-US" dirty="0"/>
           </a:p>
@@ -8339,13 +8343,13 @@
   <p:clrMapOvr>
     <a:masterClrMapping/>
   </p:clrMapOvr>
-  <mc:AlternateContent xmlns:mc="http://schemas.openxmlformats.org/markup-compatibility/2006">
-    <mc:Choice xmlns:p159="http://schemas.microsoft.com/office/powerpoint/2015/09/main" Requires="p159">
+  <mc:AlternateContent xmlns:mc="http://schemas.openxmlformats.org/markup-compatibility/2006" xmlns:p159="http://schemas.microsoft.com/office/powerpoint/2015/09/main">
+    <mc:Choice Requires="p159">
       <p:transition xmlns:p14="http://schemas.microsoft.com/office/powerpoint/2010/main" spd="slow" p14:dur="1500">
         <p159:morph option="byWord"/>
       </p:transition>
     </mc:Choice>
-    <mc:Fallback>
+    <mc:Fallback xmlns="">
       <p:transition spd="slow">
         <p:fade/>
       </p:transition>
@@ -8544,13 +8548,13 @@
   <p:clrMapOvr>
     <a:masterClrMapping/>
   </p:clrMapOvr>
-  <mc:AlternateContent xmlns:mc="http://schemas.openxmlformats.org/markup-compatibility/2006">
-    <mc:Choice xmlns:p159="http://schemas.microsoft.com/office/powerpoint/2015/09/main" Requires="p159">
+  <mc:AlternateContent xmlns:mc="http://schemas.openxmlformats.org/markup-compatibility/2006" xmlns:p159="http://schemas.microsoft.com/office/powerpoint/2015/09/main">
+    <mc:Choice Requires="p159">
       <p:transition xmlns:p14="http://schemas.microsoft.com/office/powerpoint/2010/main" spd="slow" p14:dur="1500">
         <p159:morph option="byWord"/>
       </p:transition>
     </mc:Choice>
-    <mc:Fallback>
+    <mc:Fallback xmlns="">
       <p:transition spd="slow">
         <p:fade/>
       </p:transition>
@@ -8717,7 +8721,7 @@
             <a:fld id="{A49DFD55-3C28-40EF-9E31-A92D2E4017FF}" type="slidenum">
               <a:rPr lang="en-US" smtClean="0"/>
               <a:pPr/>
-              <a:t>‹#›</a:t>
+              <a:t>‹Nr.›</a:t>
             </a:fld>
             <a:endParaRPr lang="en-US" dirty="0"/>
           </a:p>
@@ -8767,13 +8771,13 @@
   <p:clrMapOvr>
     <a:masterClrMapping/>
   </p:clrMapOvr>
-  <mc:AlternateContent xmlns:mc="http://schemas.openxmlformats.org/markup-compatibility/2006">
-    <mc:Choice xmlns:p159="http://schemas.microsoft.com/office/powerpoint/2015/09/main" Requires="p159">
+  <mc:AlternateContent xmlns:mc="http://schemas.openxmlformats.org/markup-compatibility/2006" xmlns:p159="http://schemas.microsoft.com/office/powerpoint/2015/09/main">
+    <mc:Choice Requires="p159">
       <p:transition xmlns:p14="http://schemas.microsoft.com/office/powerpoint/2010/main" spd="slow" p14:dur="1500">
         <p159:morph option="byWord"/>
       </p:transition>
     </mc:Choice>
-    <mc:Fallback>
+    <mc:Fallback xmlns="">
       <p:transition spd="slow">
         <p:fade/>
       </p:transition>
@@ -8971,7 +8975,7 @@
             <a:fld id="{A49DFD55-3C28-40EF-9E31-A92D2E4017FF}" type="slidenum">
               <a:rPr lang="en-US" smtClean="0"/>
               <a:pPr/>
-              <a:t>‹#›</a:t>
+              <a:t>‹Nr.›</a:t>
             </a:fld>
             <a:endParaRPr lang="en-US" dirty="0"/>
           </a:p>
@@ -8987,13 +8991,13 @@
   <p:clrMapOvr>
     <a:overrideClrMapping bg1="lt1" tx1="dk1" bg2="lt2" tx2="dk2" accent1="accent1" accent2="accent2" accent3="accent3" accent4="accent4" accent5="accent5" accent6="accent6" hlink="hlink" folHlink="folHlink"/>
   </p:clrMapOvr>
-  <mc:AlternateContent xmlns:mc="http://schemas.openxmlformats.org/markup-compatibility/2006">
-    <mc:Choice xmlns:p159="http://schemas.microsoft.com/office/powerpoint/2015/09/main" Requires="p159">
+  <mc:AlternateContent xmlns:mc="http://schemas.openxmlformats.org/markup-compatibility/2006" xmlns:p159="http://schemas.microsoft.com/office/powerpoint/2015/09/main">
+    <mc:Choice Requires="p159">
       <p:transition xmlns:p14="http://schemas.microsoft.com/office/powerpoint/2010/main" spd="slow" p14:dur="1500">
         <p159:morph option="byWord"/>
       </p:transition>
     </mc:Choice>
-    <mc:Fallback>
+    <mc:Fallback xmlns="">
       <p:transition spd="slow">
         <p:fade/>
       </p:transition>
@@ -9289,7 +9293,7 @@
             <a:fld id="{A49DFD55-3C28-40EF-9E31-A92D2E4017FF}" type="slidenum">
               <a:rPr lang="en-US" smtClean="0"/>
               <a:pPr/>
-              <a:t>‹#›</a:t>
+              <a:t>‹Nr.›</a:t>
             </a:fld>
             <a:endParaRPr lang="en-US" dirty="0"/>
           </a:p>
@@ -9349,13 +9353,13 @@
   <p:clrMapOvr>
     <a:masterClrMapping/>
   </p:clrMapOvr>
-  <mc:AlternateContent xmlns:mc="http://schemas.openxmlformats.org/markup-compatibility/2006">
-    <mc:Choice xmlns:p159="http://schemas.microsoft.com/office/powerpoint/2015/09/main" Requires="p159">
+  <mc:AlternateContent xmlns:mc="http://schemas.openxmlformats.org/markup-compatibility/2006" xmlns:p159="http://schemas.microsoft.com/office/powerpoint/2015/09/main">
+    <mc:Choice Requires="p159">
       <p:transition xmlns:p14="http://schemas.microsoft.com/office/powerpoint/2010/main" spd="slow" p14:dur="1500">
         <p159:morph option="byWord"/>
       </p:transition>
     </mc:Choice>
-    <mc:Fallback>
+    <mc:Fallback xmlns="">
       <p:transition spd="slow">
         <p:fade/>
       </p:transition>
@@ -10321,7 +10325,7 @@
             <a:fld id="{A49DFD55-3C28-40EF-9E31-A92D2E4017FF}" type="slidenum">
               <a:rPr lang="en-US" smtClean="0"/>
               <a:pPr/>
-              <a:t>‹#›</a:t>
+              <a:t>‹Nr.›</a:t>
             </a:fld>
             <a:endParaRPr lang="en-US" dirty="0"/>
           </a:p>
@@ -10445,13 +10449,13 @@
   <p:clrMapOvr>
     <a:overrideClrMapping bg1="lt1" tx1="dk1" bg2="lt2" tx2="dk2" accent1="accent1" accent2="accent2" accent3="accent3" accent4="accent4" accent5="accent5" accent6="accent6" hlink="hlink" folHlink="folHlink"/>
   </p:clrMapOvr>
-  <mc:AlternateContent xmlns:mc="http://schemas.openxmlformats.org/markup-compatibility/2006">
-    <mc:Choice xmlns:p159="http://schemas.microsoft.com/office/powerpoint/2015/09/main" Requires="p159">
+  <mc:AlternateContent xmlns:mc="http://schemas.openxmlformats.org/markup-compatibility/2006" xmlns:p159="http://schemas.microsoft.com/office/powerpoint/2015/09/main">
+    <mc:Choice Requires="p159">
       <p:transition xmlns:p14="http://schemas.microsoft.com/office/powerpoint/2010/main" spd="slow" p14:dur="1500">
         <p159:morph option="byWord"/>
       </p:transition>
     </mc:Choice>
-    <mc:Fallback>
+    <mc:Fallback xmlns="">
       <p:transition spd="slow">
         <p:fade/>
       </p:transition>
@@ -12420,7 +12424,7 @@
             <a:fld id="{A49DFD55-3C28-40EF-9E31-A92D2E4017FF}" type="slidenum">
               <a:rPr lang="en-US" smtClean="0"/>
               <a:pPr/>
-              <a:t>‹#›</a:t>
+              <a:t>‹Nr.›</a:t>
             </a:fld>
             <a:endParaRPr lang="en-US" dirty="0"/>
           </a:p>
@@ -12436,13 +12440,13 @@
   <p:clrMapOvr>
     <a:overrideClrMapping bg1="dk1" tx1="lt1" bg2="dk2" tx2="lt2" accent1="accent1" accent2="accent2" accent3="accent3" accent4="accent4" accent5="accent5" accent6="accent6" hlink="hlink" folHlink="folHlink"/>
   </p:clrMapOvr>
-  <mc:AlternateContent xmlns:mc="http://schemas.openxmlformats.org/markup-compatibility/2006">
-    <mc:Choice xmlns:p159="http://schemas.microsoft.com/office/powerpoint/2015/09/main" Requires="p159">
+  <mc:AlternateContent xmlns:mc="http://schemas.openxmlformats.org/markup-compatibility/2006" xmlns:p159="http://schemas.microsoft.com/office/powerpoint/2015/09/main">
+    <mc:Choice Requires="p159">
       <p:transition xmlns:p14="http://schemas.microsoft.com/office/powerpoint/2010/main" spd="slow" p14:dur="1500">
         <p159:morph option="byWord"/>
       </p:transition>
     </mc:Choice>
-    <mc:Fallback>
+    <mc:Fallback xmlns="">
       <p:transition spd="slow">
         <p:fade/>
       </p:transition>
@@ -12740,7 +12744,7 @@
           <a:p>
             <a:fld id="{A49DFD55-3C28-40EF-9E31-A92D2E4017FF}" type="slidenum">
               <a:rPr lang="en-US" smtClean="0"/>
-              <a:t>‹#›</a:t>
+              <a:t>‹Nr.›</a:t>
             </a:fld>
             <a:endParaRPr lang="en-US" dirty="0"/>
           </a:p>
@@ -12771,13 +12775,13 @@
     <p:sldLayoutId id="2147483664" r:id="rId14"/>
     <p:sldLayoutId id="2147483665" r:id="rId15"/>
   </p:sldLayoutIdLst>
-  <mc:AlternateContent xmlns:mc="http://schemas.openxmlformats.org/markup-compatibility/2006">
-    <mc:Choice xmlns:p159="http://schemas.microsoft.com/office/powerpoint/2015/09/main" Requires="p159">
+  <mc:AlternateContent xmlns:mc="http://schemas.openxmlformats.org/markup-compatibility/2006" xmlns:p159="http://schemas.microsoft.com/office/powerpoint/2015/09/main">
+    <mc:Choice Requires="p159">
       <p:transition xmlns:p14="http://schemas.microsoft.com/office/powerpoint/2010/main" spd="slow" p14:dur="1500">
         <p159:morph option="byWord"/>
       </p:transition>
     </mc:Choice>
-    <mc:Fallback>
+    <mc:Fallback xmlns="">
       <p:transition spd="slow">
         <p:fade/>
       </p:transition>
@@ -13486,13 +13490,13 @@
   <p:clrMapOvr>
     <a:masterClrMapping/>
   </p:clrMapOvr>
-  <mc:AlternateContent xmlns:mc="http://schemas.openxmlformats.org/markup-compatibility/2006">
-    <mc:Choice xmlns:p159="http://schemas.microsoft.com/office/powerpoint/2015/09/main" Requires="p159">
+  <mc:AlternateContent xmlns:mc="http://schemas.openxmlformats.org/markup-compatibility/2006" xmlns:p159="http://schemas.microsoft.com/office/powerpoint/2015/09/main">
+    <mc:Choice Requires="p159">
       <p:transition xmlns:p14="http://schemas.microsoft.com/office/powerpoint/2010/main" spd="slow" p14:dur="1500">
         <p159:morph option="byWord"/>
       </p:transition>
     </mc:Choice>
-    <mc:Fallback>
+    <mc:Fallback xmlns="">
       <p:transition spd="slow">
         <p:fade/>
       </p:transition>
@@ -14154,13 +14158,13 @@
   <p:clrMapOvr>
     <a:masterClrMapping/>
   </p:clrMapOvr>
-  <mc:AlternateContent xmlns:mc="http://schemas.openxmlformats.org/markup-compatibility/2006">
-    <mc:Choice xmlns:p159="http://schemas.microsoft.com/office/powerpoint/2015/09/main" Requires="p159">
+  <mc:AlternateContent xmlns:mc="http://schemas.openxmlformats.org/markup-compatibility/2006" xmlns:p159="http://schemas.microsoft.com/office/powerpoint/2015/09/main">
+    <mc:Choice Requires="p159">
       <p:transition xmlns:p14="http://schemas.microsoft.com/office/powerpoint/2010/main" spd="slow" p14:dur="1500">
         <p159:morph option="byWord"/>
       </p:transition>
     </mc:Choice>
-    <mc:Fallback>
+    <mc:Fallback xmlns="">
       <p:transition spd="slow">
         <p:fade/>
       </p:transition>
@@ -14351,13 +14355,13 @@
   <p:clrMapOvr>
     <a:masterClrMapping/>
   </p:clrMapOvr>
-  <mc:AlternateContent xmlns:mc="http://schemas.openxmlformats.org/markup-compatibility/2006">
-    <mc:Choice xmlns:p159="http://schemas.microsoft.com/office/powerpoint/2015/09/main" Requires="p159">
+  <mc:AlternateContent xmlns:mc="http://schemas.openxmlformats.org/markup-compatibility/2006" xmlns:p159="http://schemas.microsoft.com/office/powerpoint/2015/09/main">
+    <mc:Choice Requires="p159">
       <p:transition xmlns:p14="http://schemas.microsoft.com/office/powerpoint/2010/main" spd="slow" p14:dur="1500">
         <p159:morph option="byWord"/>
       </p:transition>
     </mc:Choice>
-    <mc:Fallback>
+    <mc:Fallback xmlns="">
       <p:transition spd="slow">
         <p:fade/>
       </p:transition>
@@ -14578,13 +14582,13 @@
   <p:clrMapOvr>
     <a:masterClrMapping/>
   </p:clrMapOvr>
-  <mc:AlternateContent xmlns:mc="http://schemas.openxmlformats.org/markup-compatibility/2006">
-    <mc:Choice xmlns:p159="http://schemas.microsoft.com/office/powerpoint/2015/09/main" Requires="p159">
+  <mc:AlternateContent xmlns:mc="http://schemas.openxmlformats.org/markup-compatibility/2006" xmlns:p159="http://schemas.microsoft.com/office/powerpoint/2015/09/main">
+    <mc:Choice Requires="p159">
       <p:transition xmlns:p14="http://schemas.microsoft.com/office/powerpoint/2010/main" spd="slow" p14:dur="1500">
         <p159:morph option="byWord"/>
       </p:transition>
     </mc:Choice>
-    <mc:Fallback>
+    <mc:Fallback xmlns="">
       <p:transition spd="slow">
         <p:fade/>
       </p:transition>
@@ -14679,13 +14683,13 @@
   <p:clrMapOvr>
     <a:masterClrMapping/>
   </p:clrMapOvr>
-  <mc:AlternateContent xmlns:mc="http://schemas.openxmlformats.org/markup-compatibility/2006">
-    <mc:Choice xmlns:p159="http://schemas.microsoft.com/office/powerpoint/2015/09/main" Requires="p159">
+  <mc:AlternateContent xmlns:mc="http://schemas.openxmlformats.org/markup-compatibility/2006" xmlns:p159="http://schemas.microsoft.com/office/powerpoint/2015/09/main">
+    <mc:Choice Requires="p159">
       <p:transition xmlns:p14="http://schemas.microsoft.com/office/powerpoint/2010/main" spd="slow" p14:dur="1500">
         <p159:morph option="byWord"/>
       </p:transition>
     </mc:Choice>
-    <mc:Fallback>
+    <mc:Fallback xmlns="">
       <p:transition spd="slow">
         <p:fade/>
       </p:transition>
@@ -14876,13 +14880,13 @@
   <p:clrMapOvr>
     <a:masterClrMapping/>
   </p:clrMapOvr>
-  <mc:AlternateContent xmlns:mc="http://schemas.openxmlformats.org/markup-compatibility/2006">
-    <mc:Choice xmlns:p159="http://schemas.microsoft.com/office/powerpoint/2015/09/main" Requires="p159">
+  <mc:AlternateContent xmlns:mc="http://schemas.openxmlformats.org/markup-compatibility/2006" xmlns:p159="http://schemas.microsoft.com/office/powerpoint/2015/09/main">
+    <mc:Choice Requires="p159">
       <p:transition xmlns:p14="http://schemas.microsoft.com/office/powerpoint/2010/main" spd="slow" p14:dur="1500">
         <p159:morph option="byWord"/>
       </p:transition>
     </mc:Choice>
-    <mc:Fallback>
+    <mc:Fallback xmlns="">
       <p:transition spd="slow">
         <p:fade/>
       </p:transition>
@@ -15079,13 +15083,13 @@
   <p:clrMapOvr>
     <a:masterClrMapping/>
   </p:clrMapOvr>
-  <mc:AlternateContent xmlns:mc="http://schemas.openxmlformats.org/markup-compatibility/2006">
-    <mc:Choice xmlns:p159="http://schemas.microsoft.com/office/powerpoint/2015/09/main" Requires="p159">
+  <mc:AlternateContent xmlns:mc="http://schemas.openxmlformats.org/markup-compatibility/2006" xmlns:p159="http://schemas.microsoft.com/office/powerpoint/2015/09/main">
+    <mc:Choice Requires="p159">
       <p:transition xmlns:p14="http://schemas.microsoft.com/office/powerpoint/2010/main" spd="slow" p14:dur="1500">
         <p159:morph option="byWord"/>
       </p:transition>
     </mc:Choice>
-    <mc:Fallback>
+    <mc:Fallback xmlns="">
       <p:transition spd="slow">
         <p:fade/>
       </p:transition>
@@ -15313,13 +15317,13 @@
   <p:clrMapOvr>
     <a:masterClrMapping/>
   </p:clrMapOvr>
-  <mc:AlternateContent xmlns:mc="http://schemas.openxmlformats.org/markup-compatibility/2006">
-    <mc:Choice xmlns:p159="http://schemas.microsoft.com/office/powerpoint/2015/09/main" Requires="p159">
+  <mc:AlternateContent xmlns:mc="http://schemas.openxmlformats.org/markup-compatibility/2006" xmlns:p159="http://schemas.microsoft.com/office/powerpoint/2015/09/main">
+    <mc:Choice Requires="p159">
       <p:transition xmlns:p14="http://schemas.microsoft.com/office/powerpoint/2010/main" spd="slow" p14:dur="1500">
         <p159:morph option="byWord"/>
       </p:transition>
     </mc:Choice>
-    <mc:Fallback>
+    <mc:Fallback xmlns="">
       <p:transition spd="slow">
         <p:fade/>
       </p:transition>
@@ -15399,7 +15403,54 @@
           <a:bodyPr/>
           <a:lstStyle/>
           <a:p>
-            <a:endParaRPr lang="de-DE" dirty="0"/>
+            <a:pPr marL="285750" indent="-285750">
+              <a:buFont typeface="Arial" panose="020B0604020202020204" pitchFamily="34" charset="0"/>
+              <a:buChar char="•"/>
+            </a:pPr>
+            <a:r>
+              <a:rPr lang="de-DE" dirty="0"/>
+              <a:t>Treten erst ab einem Schwellenwert auf</a:t>
+            </a:r>
+          </a:p>
+          <a:p>
+            <a:pPr marL="285750" indent="-285750">
+              <a:buFont typeface="Arial" panose="020B0604020202020204" pitchFamily="34" charset="0"/>
+              <a:buChar char="•"/>
+            </a:pPr>
+            <a:r>
+              <a:rPr lang="de-DE" dirty="0"/>
+              <a:t>Schwere der Schäden steigt mit Dosiswert</a:t>
+            </a:r>
+          </a:p>
+          <a:p>
+            <a:pPr marL="285750" indent="-285750">
+              <a:buFont typeface="Arial" panose="020B0604020202020204" pitchFamily="34" charset="0"/>
+              <a:buChar char="•"/>
+            </a:pPr>
+            <a:r>
+              <a:rPr lang="de-DE" dirty="0"/>
+              <a:t>Auftreten unabhängig vom bestrahlten Volumen/Oberfläche</a:t>
+            </a:r>
+          </a:p>
+          <a:p>
+            <a:pPr marL="285750" indent="-285750">
+              <a:buFont typeface="Arial" panose="020B0604020202020204" pitchFamily="34" charset="0"/>
+              <a:buChar char="•"/>
+            </a:pPr>
+            <a:r>
+              <a:rPr lang="de-DE" dirty="0"/>
+              <a:t>Sichtbar kurz nach Bestrahlung</a:t>
+            </a:r>
+          </a:p>
+          <a:p>
+            <a:pPr marL="285750" indent="-285750">
+              <a:buFont typeface="Arial" panose="020B0604020202020204" pitchFamily="34" charset="0"/>
+              <a:buChar char="•"/>
+            </a:pPr>
+            <a:r>
+              <a:rPr lang="de-DE" dirty="0"/>
+              <a:t>Beispiele: Katarakte (Grauer Star), Hautrötung</a:t>
+            </a:r>
           </a:p>
         </p:txBody>
       </p:sp>
@@ -15413,13 +15464,13 @@
   <p:clrMapOvr>
     <a:masterClrMapping/>
   </p:clrMapOvr>
-  <mc:AlternateContent xmlns:mc="http://schemas.openxmlformats.org/markup-compatibility/2006">
-    <mc:Choice xmlns:p159="http://schemas.microsoft.com/office/powerpoint/2015/09/main" Requires="p159">
+  <mc:AlternateContent xmlns:mc="http://schemas.openxmlformats.org/markup-compatibility/2006" xmlns:p159="http://schemas.microsoft.com/office/powerpoint/2015/09/main">
+    <mc:Choice Requires="p159">
       <p:transition xmlns:p14="http://schemas.microsoft.com/office/powerpoint/2010/main" spd="slow" p14:dur="1500">
         <p159:morph option="byWord"/>
       </p:transition>
     </mc:Choice>
-    <mc:Fallback>
+    <mc:Fallback xmlns="">
       <p:transition spd="slow">
         <p:fade/>
       </p:transition>
@@ -15499,6 +15550,58 @@
           <a:bodyPr/>
           <a:lstStyle/>
           <a:p>
+            <a:pPr marL="285750" indent="-285750">
+              <a:buFont typeface="Arial" panose="020B0604020202020204" pitchFamily="34" charset="0"/>
+              <a:buChar char="•"/>
+            </a:pPr>
+            <a:r>
+              <a:rPr lang="de-DE" dirty="0"/>
+              <a:t>Nicht von einem Grenzwert oder sonstigem abhängig</a:t>
+            </a:r>
+          </a:p>
+          <a:p>
+            <a:pPr marL="285750" indent="-285750">
+              <a:buFont typeface="Arial" panose="020B0604020202020204" pitchFamily="34" charset="0"/>
+              <a:buChar char="•"/>
+            </a:pPr>
+            <a:r>
+              <a:rPr lang="de-DE" dirty="0"/>
+              <a:t>Wahrscheinlichkeit proportional zur bestrahlten Fläche/Volumen, Schwere der Schäden unabhängig</a:t>
+            </a:r>
+          </a:p>
+          <a:p>
+            <a:pPr marL="285750" indent="-285750">
+              <a:buFont typeface="Arial" panose="020B0604020202020204" pitchFamily="34" charset="0"/>
+              <a:buChar char="•"/>
+            </a:pPr>
+            <a:r>
+              <a:rPr lang="de-DE" dirty="0"/>
+              <a:t>Verzögerung der Wirkung von wenigen Monate bis viele Jahre</a:t>
+            </a:r>
+          </a:p>
+          <a:p>
+            <a:pPr marL="742950" lvl="1" indent="-285750">
+              <a:buFont typeface="Wingdings" panose="05000000000000000000" pitchFamily="2" charset="2"/>
+              <a:buChar char="è"/>
+            </a:pPr>
+            <a:r>
+              <a:rPr lang="de-DE" dirty="0">
+                <a:sym typeface="Wingdings" panose="05000000000000000000" pitchFamily="2" charset="2"/>
+              </a:rPr>
+              <a:t>Langzeitschäden</a:t>
+            </a:r>
+          </a:p>
+          <a:p>
+            <a:pPr marL="285750" indent="-285750">
+              <a:buFont typeface="Arial" panose="020B0604020202020204" pitchFamily="34" charset="0"/>
+              <a:buChar char="•"/>
+            </a:pPr>
+            <a:r>
+              <a:rPr lang="de-DE" dirty="0">
+                <a:sym typeface="Wingdings" panose="05000000000000000000" pitchFamily="2" charset="2"/>
+              </a:rPr>
+              <a:t>Beispiele: Krebserkrankungen, hereditäre (vererbbare) Schäden</a:t>
+            </a:r>
             <a:endParaRPr lang="de-DE" dirty="0"/>
           </a:p>
         </p:txBody>
@@ -15513,13 +15616,13 @@
   <p:clrMapOvr>
     <a:masterClrMapping/>
   </p:clrMapOvr>
-  <mc:AlternateContent xmlns:mc="http://schemas.openxmlformats.org/markup-compatibility/2006">
-    <mc:Choice xmlns:p159="http://schemas.microsoft.com/office/powerpoint/2015/09/main" Requires="p159">
+  <mc:AlternateContent xmlns:mc="http://schemas.openxmlformats.org/markup-compatibility/2006" xmlns:p159="http://schemas.microsoft.com/office/powerpoint/2015/09/main">
+    <mc:Choice Requires="p159">
       <p:transition xmlns:p14="http://schemas.microsoft.com/office/powerpoint/2010/main" spd="slow" p14:dur="1500">
         <p159:morph option="byWord"/>
       </p:transition>
     </mc:Choice>
-    <mc:Fallback>
+    <mc:Fallback xmlns="">
       <p:transition spd="slow">
         <p:fade/>
       </p:transition>
@@ -15599,7 +15702,44 @@
           <a:bodyPr/>
           <a:lstStyle/>
           <a:p>
-            <a:endParaRPr lang="de-DE" dirty="0"/>
+            <a:pPr marL="285750" indent="-285750">
+              <a:buFont typeface="Arial" panose="020B0604020202020204" pitchFamily="34" charset="0"/>
+              <a:buChar char="•"/>
+            </a:pPr>
+            <a:r>
+              <a:rPr lang="de-DE" dirty="0"/>
+              <a:t>Unterklasse der stochastischen Schäden</a:t>
+            </a:r>
+          </a:p>
+          <a:p>
+            <a:pPr marL="285750" indent="-285750">
+              <a:buFont typeface="Arial" panose="020B0604020202020204" pitchFamily="34" charset="0"/>
+              <a:buChar char="•"/>
+            </a:pPr>
+            <a:r>
+              <a:rPr lang="de-DE" dirty="0"/>
+              <a:t>Unterteilung in:</a:t>
+            </a:r>
+          </a:p>
+          <a:p>
+            <a:pPr marL="742950" lvl="1" indent="-285750">
+              <a:buFont typeface="Arial" panose="020B0604020202020204" pitchFamily="34" charset="0"/>
+              <a:buChar char="•"/>
+            </a:pPr>
+            <a:r>
+              <a:rPr lang="de-DE" dirty="0"/>
+              <a:t>Frühschäden: ähnlich zu den deterministischen Schäden</a:t>
+            </a:r>
+          </a:p>
+          <a:p>
+            <a:pPr marL="742950" lvl="1" indent="-285750">
+              <a:buFont typeface="Arial" panose="020B0604020202020204" pitchFamily="34" charset="0"/>
+              <a:buChar char="•"/>
+            </a:pPr>
+            <a:r>
+              <a:rPr lang="de-DE" dirty="0"/>
+              <a:t>Spätschäden: Krebs und Leukämie</a:t>
+            </a:r>
           </a:p>
         </p:txBody>
       </p:sp>
@@ -15613,13 +15753,13 @@
   <p:clrMapOvr>
     <a:masterClrMapping/>
   </p:clrMapOvr>
-  <mc:AlternateContent xmlns:mc="http://schemas.openxmlformats.org/markup-compatibility/2006">
-    <mc:Choice xmlns:p159="http://schemas.microsoft.com/office/powerpoint/2015/09/main" Requires="p159">
+  <mc:AlternateContent xmlns:mc="http://schemas.openxmlformats.org/markup-compatibility/2006" xmlns:p159="http://schemas.microsoft.com/office/powerpoint/2015/09/main">
+    <mc:Choice Requires="p159">
       <p:transition xmlns:p14="http://schemas.microsoft.com/office/powerpoint/2010/main" spd="slow" p14:dur="1500">
         <p159:morph option="byWord"/>
       </p:transition>
     </mc:Choice>
-    <mc:Fallback>
+    <mc:Fallback xmlns="">
       <p:transition spd="slow">
         <p:fade/>
       </p:transition>
@@ -15752,13 +15892,13 @@
   <p:clrMapOvr>
     <a:masterClrMapping/>
   </p:clrMapOvr>
-  <mc:AlternateContent xmlns:mc="http://schemas.openxmlformats.org/markup-compatibility/2006">
-    <mc:Choice xmlns:p159="http://schemas.microsoft.com/office/powerpoint/2015/09/main" Requires="p159">
+  <mc:AlternateContent xmlns:mc="http://schemas.openxmlformats.org/markup-compatibility/2006" xmlns:p159="http://schemas.microsoft.com/office/powerpoint/2015/09/main">
+    <mc:Choice Requires="p159">
       <p:transition xmlns:p14="http://schemas.microsoft.com/office/powerpoint/2010/main" spd="slow" p14:dur="1500">
         <p159:morph option="byWord"/>
       </p:transition>
     </mc:Choice>
-    <mc:Fallback>
+    <mc:Fallback xmlns="">
       <p:transition spd="slow">
         <p:fade/>
       </p:transition>
@@ -15955,13 +16095,13 @@
   <p:clrMapOvr>
     <a:masterClrMapping/>
   </p:clrMapOvr>
-  <mc:AlternateContent xmlns:mc="http://schemas.openxmlformats.org/markup-compatibility/2006">
-    <mc:Choice xmlns:p159="http://schemas.microsoft.com/office/powerpoint/2015/09/main" Requires="p159">
+  <mc:AlternateContent xmlns:mc="http://schemas.openxmlformats.org/markup-compatibility/2006" xmlns:p159="http://schemas.microsoft.com/office/powerpoint/2015/09/main">
+    <mc:Choice Requires="p159">
       <p:transition xmlns:p14="http://schemas.microsoft.com/office/powerpoint/2010/main" spd="slow" p14:dur="1500">
         <p159:morph option="byWord"/>
       </p:transition>
     </mc:Choice>
-    <mc:Fallback>
+    <mc:Fallback xmlns="">
       <p:transition spd="slow">
         <p:fade/>
       </p:transition>
@@ -16164,13 +16304,13 @@
   <p:clrMapOvr>
     <a:masterClrMapping/>
   </p:clrMapOvr>
-  <mc:AlternateContent xmlns:mc="http://schemas.openxmlformats.org/markup-compatibility/2006">
-    <mc:Choice xmlns:p159="http://schemas.microsoft.com/office/powerpoint/2015/09/main" Requires="p159">
+  <mc:AlternateContent xmlns:mc="http://schemas.openxmlformats.org/markup-compatibility/2006" xmlns:p159="http://schemas.microsoft.com/office/powerpoint/2015/09/main">
+    <mc:Choice Requires="p159">
       <p:transition xmlns:p14="http://schemas.microsoft.com/office/powerpoint/2010/main" spd="slow" p14:dur="1500">
         <p159:morph option="byWord"/>
       </p:transition>
     </mc:Choice>
-    <mc:Fallback>
+    <mc:Fallback xmlns="">
       <p:transition spd="slow">
         <p:fade/>
       </p:transition>
@@ -16393,13 +16533,13 @@
   <p:clrMapOvr>
     <a:masterClrMapping/>
   </p:clrMapOvr>
-  <mc:AlternateContent xmlns:mc="http://schemas.openxmlformats.org/markup-compatibility/2006">
-    <mc:Choice xmlns:p159="http://schemas.microsoft.com/office/powerpoint/2015/09/main" Requires="p159">
+  <mc:AlternateContent xmlns:mc="http://schemas.openxmlformats.org/markup-compatibility/2006" xmlns:p159="http://schemas.microsoft.com/office/powerpoint/2015/09/main">
+    <mc:Choice Requires="p159">
       <p:transition xmlns:p14="http://schemas.microsoft.com/office/powerpoint/2010/main" spd="slow" p14:dur="1500">
         <p159:morph option="byWord"/>
       </p:transition>
     </mc:Choice>
-    <mc:Fallback>
+    <mc:Fallback xmlns="">
       <p:transition spd="slow">
         <p:fade/>
       </p:transition>
@@ -16446,7 +16586,10 @@
           <a:bodyPr/>
           <a:lstStyle/>
           <a:p>
-            <a:endParaRPr lang="de-DE"/>
+            <a:r>
+              <a:rPr lang="de-DE" dirty="0"/>
+              <a:t>Auswirkungen auf den menschlichen Körper</a:t>
+            </a:r>
           </a:p>
         </p:txBody>
       </p:sp>
@@ -16469,14 +16612,176 @@
         <p:spPr>
           <a:xfrm>
             <a:off x="2933700" y="2468880"/>
-            <a:ext cx="8421688" cy="3363593"/>
+            <a:ext cx="8421688" cy="4084320"/>
           </a:xfrm>
         </p:spPr>
         <p:txBody>
-          <a:bodyPr/>
+          <a:bodyPr>
+            <a:normAutofit lnSpcReduction="10000"/>
+          </a:bodyPr>
           <a:lstStyle/>
           <a:p>
-            <a:endParaRPr lang="de-DE" dirty="0"/>
+            <a:pPr marL="285750" indent="-285750">
+              <a:buFont typeface="Arial" panose="020B0604020202020204" pitchFamily="34" charset="0"/>
+              <a:buChar char="•"/>
+            </a:pPr>
+            <a:r>
+              <a:rPr lang="de-DE" dirty="0"/>
+              <a:t>Ab ~0,25 Sv: Sinken der Lymphozytenzahl im Blut / Veränderung des Blutbildes</a:t>
+            </a:r>
+          </a:p>
+          <a:p>
+            <a:pPr marL="285750" indent="-285750">
+              <a:buFont typeface="Arial" panose="020B0604020202020204" pitchFamily="34" charset="0"/>
+              <a:buChar char="•"/>
+            </a:pPr>
+            <a:r>
+              <a:rPr lang="de-DE" dirty="0"/>
+              <a:t>Ab ~1 Sv: vorrübergehende Strahlenkrankheit („Strahlenkater“)</a:t>
+            </a:r>
+          </a:p>
+          <a:p>
+            <a:pPr lvl="1"/>
+            <a:r>
+              <a:rPr lang="de-DE" dirty="0">
+                <a:sym typeface="Wingdings" panose="05000000000000000000" pitchFamily="2" charset="2"/>
+              </a:rPr>
+              <a:t> </a:t>
+            </a:r>
+            <a:r>
+              <a:rPr lang="de-DE" dirty="0"/>
+              <a:t>Nach wenigen Wochen: Haarausfall, Hautrötungen etc.</a:t>
+            </a:r>
+          </a:p>
+          <a:p>
+            <a:pPr marL="285750" indent="-285750">
+              <a:buFont typeface="Arial" panose="020B0604020202020204" pitchFamily="34" charset="0"/>
+              <a:buChar char="•"/>
+            </a:pPr>
+            <a:r>
+              <a:rPr lang="de-DE" dirty="0"/>
+              <a:t>Ab ~4 Sv: schwere Strahlenkrankheit (50% Todeschance bei nichtbehandlung)</a:t>
+            </a:r>
+          </a:p>
+          <a:p>
+            <a:pPr marL="742950" lvl="1" indent="-285750">
+              <a:buFont typeface="Wingdings" panose="05000000000000000000" pitchFamily="2" charset="2"/>
+              <a:buChar char="è"/>
+            </a:pPr>
+            <a:r>
+              <a:rPr lang="de-DE" dirty="0">
+                <a:sym typeface="Wingdings" panose="05000000000000000000" pitchFamily="2" charset="2"/>
+              </a:rPr>
+              <a:t>Gesteigertes Infektionsrisiko (fast keine Lymphozyten mehr)</a:t>
+            </a:r>
+          </a:p>
+          <a:p>
+            <a:pPr marL="742950" lvl="1" indent="-285750">
+              <a:buFont typeface="Wingdings" panose="05000000000000000000" pitchFamily="2" charset="2"/>
+              <a:buChar char="è"/>
+            </a:pPr>
+            <a:r>
+              <a:rPr lang="de-DE" dirty="0">
+                <a:sym typeface="Wingdings" panose="05000000000000000000" pitchFamily="2" charset="2"/>
+              </a:rPr>
+              <a:t>Innere Blutungen</a:t>
+            </a:r>
+          </a:p>
+          <a:p>
+            <a:pPr marL="742950" lvl="1" indent="-285750">
+              <a:buFont typeface="Wingdings" panose="05000000000000000000" pitchFamily="2" charset="2"/>
+              <a:buChar char="è"/>
+            </a:pPr>
+            <a:r>
+              <a:rPr lang="de-DE" dirty="0">
+                <a:sym typeface="Wingdings" panose="05000000000000000000" pitchFamily="2" charset="2"/>
+              </a:rPr>
+              <a:t>Fieber</a:t>
+            </a:r>
+          </a:p>
+          <a:p>
+            <a:pPr marL="742950" lvl="1" indent="-285750">
+              <a:buFont typeface="Wingdings" panose="05000000000000000000" pitchFamily="2" charset="2"/>
+              <a:buChar char="è"/>
+            </a:pPr>
+            <a:r>
+              <a:rPr lang="de-DE" dirty="0">
+                <a:sym typeface="Wingdings" panose="05000000000000000000" pitchFamily="2" charset="2"/>
+              </a:rPr>
+              <a:t>Sterilität / Zyklusstörungen</a:t>
+            </a:r>
+          </a:p>
+          <a:p>
+            <a:pPr marL="285750" indent="-285750">
+              <a:buFont typeface="Arial" panose="020B0604020202020204" pitchFamily="34" charset="0"/>
+              <a:buChar char="•"/>
+            </a:pPr>
+            <a:r>
+              <a:rPr lang="de-DE" dirty="0">
+                <a:sym typeface="Wingdings" panose="05000000000000000000" pitchFamily="2" charset="2"/>
+              </a:rPr>
+              <a:t>Letale Dosis: ~7 Sv:</a:t>
+            </a:r>
+          </a:p>
+          <a:p>
+            <a:pPr marL="742950" lvl="1" indent="-285750">
+              <a:buFont typeface="Wingdings" panose="05000000000000000000" pitchFamily="2" charset="2"/>
+              <a:buChar char="è"/>
+            </a:pPr>
+            <a:r>
+              <a:rPr lang="de-DE" dirty="0">
+                <a:sym typeface="Wingdings" panose="05000000000000000000" pitchFamily="2" charset="2"/>
+              </a:rPr>
+              <a:t>Zunächst Übelkeit/Erbrechen</a:t>
+            </a:r>
+          </a:p>
+          <a:p>
+            <a:pPr marL="742950" lvl="1" indent="-285750">
+              <a:buFont typeface="Wingdings" panose="05000000000000000000" pitchFamily="2" charset="2"/>
+              <a:buChar char="è"/>
+            </a:pPr>
+            <a:r>
+              <a:rPr lang="de-DE" dirty="0">
+                <a:sym typeface="Wingdings" panose="05000000000000000000" pitchFamily="2" charset="2"/>
+              </a:rPr>
+              <a:t>Entzündungen der Schleimhäute</a:t>
+            </a:r>
+          </a:p>
+          <a:p>
+            <a:pPr marL="742950" lvl="1" indent="-285750">
+              <a:buFont typeface="Wingdings" panose="05000000000000000000" pitchFamily="2" charset="2"/>
+              <a:buChar char="è"/>
+            </a:pPr>
+            <a:r>
+              <a:rPr lang="de-DE" dirty="0">
+                <a:sym typeface="Wingdings" panose="05000000000000000000" pitchFamily="2" charset="2"/>
+              </a:rPr>
+              <a:t>Fieber</a:t>
+            </a:r>
+          </a:p>
+          <a:p>
+            <a:pPr marL="742950" lvl="1" indent="-285750">
+              <a:buFont typeface="Wingdings" panose="05000000000000000000" pitchFamily="2" charset="2"/>
+              <a:buChar char="è"/>
+            </a:pPr>
+            <a:r>
+              <a:rPr lang="de-DE" dirty="0">
+                <a:sym typeface="Wingdings" panose="05000000000000000000" pitchFamily="2" charset="2"/>
+              </a:rPr>
+              <a:t>Kraftverlust</a:t>
+            </a:r>
+          </a:p>
+          <a:p>
+            <a:pPr marL="742950" lvl="1" indent="-285750">
+              <a:buFont typeface="Wingdings" panose="05000000000000000000" pitchFamily="2" charset="2"/>
+              <a:buChar char="è"/>
+            </a:pPr>
+            <a:r>
+              <a:rPr lang="de-DE" dirty="0">
+                <a:sym typeface="Wingdings" panose="05000000000000000000" pitchFamily="2" charset="2"/>
+              </a:rPr>
+              <a:t>Tod</a:t>
+            </a:r>
           </a:p>
         </p:txBody>
       </p:sp>
@@ -16490,13 +16795,13 @@
   <p:clrMapOvr>
     <a:masterClrMapping/>
   </p:clrMapOvr>
-  <mc:AlternateContent xmlns:mc="http://schemas.openxmlformats.org/markup-compatibility/2006">
-    <mc:Choice xmlns:p159="http://schemas.microsoft.com/office/powerpoint/2015/09/main" Requires="p159">
+  <mc:AlternateContent xmlns:mc="http://schemas.openxmlformats.org/markup-compatibility/2006" xmlns:p159="http://schemas.microsoft.com/office/powerpoint/2015/09/main">
+    <mc:Choice Requires="p159">
       <p:transition xmlns:p14="http://schemas.microsoft.com/office/powerpoint/2010/main" spd="slow" p14:dur="1500">
         <p159:morph option="byWord"/>
       </p:transition>
     </mc:Choice>
-    <mc:Fallback>
+    <mc:Fallback xmlns="">
       <p:transition spd="slow">
         <p:fade/>
       </p:transition>
@@ -16524,10 +16829,10 @@
       </p:grpSpPr>
       <p:sp>
         <p:nvSpPr>
-          <p:cNvPr id="10" name="Title 9">
-            <a:extLst>
-              <a:ext uri="{FF2B5EF4-FFF2-40B4-BE49-F238E27FC236}">
-                <a16:creationId xmlns:a16="http://schemas.microsoft.com/office/drawing/2014/main" id="{F5234B45-169E-460C-B432-5FD7C434E42E}"/>
+          <p:cNvPr id="4" name="Title 3">
+            <a:extLst>
+              <a:ext uri="{FF2B5EF4-FFF2-40B4-BE49-F238E27FC236}">
+                <a16:creationId xmlns:a16="http://schemas.microsoft.com/office/drawing/2014/main" id="{4F09AC6C-00AD-4BB5-9AD3-C5F4C9465FA5}"/>
               </a:ext>
             </a:extLst>
           </p:cNvPr>
@@ -16545,17 +16850,17 @@
           <a:p>
             <a:r>
               <a:rPr lang="de-DE" dirty="0"/>
-              <a:t>Gliederung</a:t>
+              <a:t>Auswirkungen auf die Zelle</a:t>
             </a:r>
           </a:p>
         </p:txBody>
       </p:sp>
       <p:sp>
         <p:nvSpPr>
-          <p:cNvPr id="11" name="Content Placeholder 10">
-            <a:extLst>
-              <a:ext uri="{FF2B5EF4-FFF2-40B4-BE49-F238E27FC236}">
-                <a16:creationId xmlns:a16="http://schemas.microsoft.com/office/drawing/2014/main" id="{F943316B-60C4-447D-BAA9-CC3020645455}"/>
+          <p:cNvPr id="6" name="Content Placeholder 5">
+            <a:extLst>
+              <a:ext uri="{FF2B5EF4-FFF2-40B4-BE49-F238E27FC236}">
+                <a16:creationId xmlns:a16="http://schemas.microsoft.com/office/drawing/2014/main" id="{D18E0113-9EEC-44E4-8991-58C715DADCB5}"/>
               </a:ext>
             </a:extLst>
           </p:cNvPr>
@@ -16563,149 +16868,159 @@
             <a:spLocks noGrp="1"/>
           </p:cNvSpPr>
           <p:nvPr>
-            <p:ph idx="1"/>
-          </p:nvPr>
-        </p:nvSpPr>
-        <p:spPr/>
-        <p:txBody>
-          <a:bodyPr/>
-          <a:lstStyle/>
-          <a:p>
-            <a:r>
-              <a:rPr lang="de-DE" strike="sngStrike" dirty="0">
-                <a:solidFill>
-                  <a:schemeClr val="bg1">
-                    <a:lumMod val="50000"/>
-                  </a:schemeClr>
-                </a:solidFill>
-              </a:rPr>
-              <a:t>Dosisgrößen</a:t>
-            </a:r>
-          </a:p>
-          <a:p>
-            <a:r>
-              <a:rPr lang="de-DE" strike="sngStrike" dirty="0">
-                <a:solidFill>
-                  <a:schemeClr val="bg1">
-                    <a:lumMod val="50000"/>
-                  </a:schemeClr>
-                </a:solidFill>
-              </a:rPr>
-              <a:t>Eindringen von Strahlung</a:t>
-            </a:r>
-          </a:p>
-          <a:p>
-            <a:r>
-              <a:rPr lang="de-DE" strike="sngStrike" dirty="0">
-                <a:solidFill>
-                  <a:schemeClr val="bg1">
-                    <a:lumMod val="50000"/>
-                  </a:schemeClr>
-                </a:solidFill>
-              </a:rPr>
-              <a:t>Unterscheiden der Auswirkungen</a:t>
-            </a:r>
-          </a:p>
-          <a:p>
-            <a:r>
-              <a:rPr lang="de-DE" dirty="0"/>
-              <a:t>Wirkungen auf den Menschen</a:t>
-            </a:r>
-          </a:p>
-          <a:p>
-            <a:r>
-              <a:rPr lang="de-DE" dirty="0"/>
-              <a:t>Hormesis</a:t>
-            </a:r>
-          </a:p>
-        </p:txBody>
-      </p:sp>
-      <p:sp>
-        <p:nvSpPr>
-          <p:cNvPr id="4" name="Footer Placeholder 3">
-            <a:extLst>
-              <a:ext uri="{FF2B5EF4-FFF2-40B4-BE49-F238E27FC236}">
-                <a16:creationId xmlns:a16="http://schemas.microsoft.com/office/drawing/2014/main" id="{4FF702D5-0D0F-4728-89CB-AC9BAEF622F7}"/>
-              </a:ext>
-            </a:extLst>
-          </p:cNvPr>
-          <p:cNvSpPr>
-            <a:spLocks noGrp="1"/>
-          </p:cNvSpPr>
-          <p:nvPr>
-            <p:ph type="ftr" sz="quarter" idx="11"/>
+            <p:ph sz="half" idx="2"/>
           </p:nvPr>
         </p:nvSpPr>
         <p:spPr>
           <a:xfrm>
-            <a:off x="2482026" y="6356349"/>
-            <a:ext cx="2937810" cy="365125"/>
+            <a:off x="2933700" y="2468880"/>
+            <a:ext cx="8421688" cy="4084320"/>
           </a:xfrm>
         </p:spPr>
         <p:txBody>
-          <a:bodyPr/>
+          <a:bodyPr>
+            <a:normAutofit/>
+          </a:bodyPr>
           <a:lstStyle/>
           <a:p>
-            <a:r>
-              <a:rPr lang="de-DE"/>
-              <a:t>Die biologischen Wirkungen radioaktiver Strahlung</a:t>
-            </a:r>
-            <a:endParaRPr lang="de-DE" dirty="0"/>
-          </a:p>
-        </p:txBody>
-      </p:sp>
-      <p:sp>
-        <p:nvSpPr>
-          <p:cNvPr id="5" name="Slide Number Placeholder 4">
-            <a:extLst>
-              <a:ext uri="{FF2B5EF4-FFF2-40B4-BE49-F238E27FC236}">
-                <a16:creationId xmlns:a16="http://schemas.microsoft.com/office/drawing/2014/main" id="{8C9FD71D-BBF7-4F35-8676-077BDE3CA819}"/>
-              </a:ext>
-            </a:extLst>
-          </p:cNvPr>
-          <p:cNvSpPr>
-            <a:spLocks noGrp="1"/>
-          </p:cNvSpPr>
-          <p:nvPr>
-            <p:ph type="sldNum" sz="quarter" idx="12"/>
-          </p:nvPr>
-        </p:nvSpPr>
-        <p:spPr>
-          <a:xfrm>
-            <a:off x="5536305" y="6356350"/>
-            <a:ext cx="987552" cy="365125"/>
-          </a:xfrm>
-        </p:spPr>
-        <p:txBody>
-          <a:bodyPr/>
-          <a:lstStyle/>
-          <a:p>
-            <a:fld id="{A49DFD55-3C28-40EF-9E31-A92D2E4017FF}" type="slidenum">
-              <a:rPr lang="en-US" smtClean="0"/>
-              <a:pPr/>
-              <a:t>24</a:t>
-            </a:fld>
-            <a:endParaRPr lang="en-US" dirty="0"/>
+            <a:pPr marL="285750" indent="-285750">
+              <a:buFont typeface="Arial" panose="020B0604020202020204" pitchFamily="34" charset="0"/>
+              <a:buChar char="•"/>
+            </a:pPr>
+            <a:r>
+              <a:rPr lang="de-DE" dirty="0">
+                <a:sym typeface="Wingdings" panose="05000000000000000000" pitchFamily="2" charset="2"/>
+              </a:rPr>
+              <a:t>Unterteilung in 4 Phasen:</a:t>
+            </a:r>
+          </a:p>
+          <a:p>
+            <a:pPr marL="800100" lvl="1" indent="-342900">
+              <a:buFont typeface="+mj-lt"/>
+              <a:buAutoNum type="arabicPeriod"/>
+            </a:pPr>
+            <a:r>
+              <a:rPr lang="de-DE" dirty="0">
+                <a:sym typeface="Wingdings" panose="05000000000000000000" pitchFamily="2" charset="2"/>
+              </a:rPr>
+              <a:t>Physikalische Phase: </a:t>
+            </a:r>
+          </a:p>
+          <a:p>
+            <a:pPr marL="1257300" lvl="2" indent="-342900">
+              <a:buFont typeface="Symbol" panose="05050102010706020507" pitchFamily="18" charset="2"/>
+              <a:buChar char="-"/>
+            </a:pPr>
+            <a:r>
+              <a:rPr lang="de-DE" dirty="0">
+                <a:sym typeface="Wingdings" panose="05000000000000000000" pitchFamily="2" charset="2"/>
+              </a:rPr>
+              <a:t>Ionisierung der Biomoleküle  Modifikation / Zerstörung</a:t>
+            </a:r>
+          </a:p>
+          <a:p>
+            <a:pPr marL="800100" lvl="1" indent="-342900">
+              <a:buFont typeface="+mj-lt"/>
+              <a:buAutoNum type="arabicPeriod"/>
+            </a:pPr>
+            <a:r>
+              <a:rPr lang="de-DE" dirty="0">
+                <a:sym typeface="Wingdings" panose="05000000000000000000" pitchFamily="2" charset="2"/>
+              </a:rPr>
+              <a:t>Physikochemische Phase:</a:t>
+            </a:r>
+          </a:p>
+          <a:p>
+            <a:pPr marL="1257300" lvl="2" indent="-342900">
+              <a:buFont typeface="Symbol" panose="05050102010706020507" pitchFamily="18" charset="2"/>
+              <a:buChar char="-"/>
+            </a:pPr>
+            <a:r>
+              <a:rPr lang="de-DE" dirty="0">
+                <a:sym typeface="Wingdings" panose="05000000000000000000" pitchFamily="2" charset="2"/>
+              </a:rPr>
+              <a:t>Rekombination / Ausbildung freier Radikale</a:t>
+            </a:r>
+          </a:p>
+          <a:p>
+            <a:pPr marL="800100" lvl="1" indent="-342900">
+              <a:buFont typeface="+mj-lt"/>
+              <a:buAutoNum type="arabicPeriod"/>
+            </a:pPr>
+            <a:r>
+              <a:rPr lang="de-DE" dirty="0">
+                <a:sym typeface="Wingdings" panose="05000000000000000000" pitchFamily="2" charset="2"/>
+              </a:rPr>
+              <a:t>Chemische Phase:</a:t>
+            </a:r>
+          </a:p>
+          <a:p>
+            <a:pPr marL="1257300" lvl="2" indent="-342900">
+              <a:buFont typeface="Symbol" panose="05050102010706020507" pitchFamily="18" charset="2"/>
+              <a:buChar char="-"/>
+            </a:pPr>
+            <a:r>
+              <a:rPr lang="de-DE" dirty="0">
+                <a:sym typeface="Wingdings" panose="05000000000000000000" pitchFamily="2" charset="2"/>
+              </a:rPr>
+              <a:t>Veränderung des Zellwassers  Radikale &amp; andere Produkte (Radiolyse)</a:t>
+            </a:r>
+          </a:p>
+          <a:p>
+            <a:pPr marL="800100" lvl="1" indent="-342900">
+              <a:buFont typeface="+mj-lt"/>
+              <a:buAutoNum type="arabicPeriod"/>
+            </a:pPr>
+            <a:r>
+              <a:rPr lang="de-DE" dirty="0">
+                <a:sym typeface="Wingdings" panose="05000000000000000000" pitchFamily="2" charset="2"/>
+              </a:rPr>
+              <a:t>Biologische Phase:</a:t>
+            </a:r>
+          </a:p>
+          <a:p>
+            <a:pPr marL="1257300" lvl="2" indent="-342900">
+              <a:buFont typeface="Symbol" panose="05050102010706020507" pitchFamily="18" charset="2"/>
+              <a:buChar char="-"/>
+            </a:pPr>
+            <a:r>
+              <a:rPr lang="de-DE" dirty="0">
+                <a:sym typeface="Wingdings" panose="05000000000000000000" pitchFamily="2" charset="2"/>
+              </a:rPr>
+              <a:t>Zerstörung von DNS, Proteinen, Aminosäuren etc.  Mutation / Zelltod</a:t>
+            </a:r>
+          </a:p>
+          <a:p>
+            <a:pPr marL="1257300" lvl="2" indent="-342900">
+              <a:buFont typeface="Symbol" panose="05050102010706020507" pitchFamily="18" charset="2"/>
+              <a:buChar char="-"/>
+            </a:pPr>
+            <a:r>
+              <a:rPr lang="de-DE" dirty="0">
+                <a:sym typeface="Wingdings" panose="05000000000000000000" pitchFamily="2" charset="2"/>
+              </a:rPr>
+              <a:t>Aber: Reparatur durch Glykosylase, Endonuklease, Polymerase, Ligase möglich</a:t>
+            </a:r>
           </a:p>
         </p:txBody>
       </p:sp>
     </p:spTree>
     <p:extLst>
       <p:ext uri="{BB962C8B-B14F-4D97-AF65-F5344CB8AC3E}">
-        <p14:creationId xmlns:p14="http://schemas.microsoft.com/office/powerpoint/2010/main" val="1666186775"/>
+        <p14:creationId xmlns:p14="http://schemas.microsoft.com/office/powerpoint/2010/main" val="1624181480"/>
       </p:ext>
     </p:extLst>
   </p:cSld>
   <p:clrMapOvr>
     <a:masterClrMapping/>
   </p:clrMapOvr>
-  <mc:AlternateContent xmlns:mc="http://schemas.openxmlformats.org/markup-compatibility/2006">
-    <mc:Choice xmlns:p159="http://schemas.microsoft.com/office/powerpoint/2015/09/main" Requires="p159">
+  <mc:AlternateContent xmlns:mc="http://schemas.openxmlformats.org/markup-compatibility/2006" xmlns:p159="http://schemas.microsoft.com/office/powerpoint/2015/09/main">
+    <mc:Choice Requires="p159">
       <p:transition xmlns:p14="http://schemas.microsoft.com/office/powerpoint/2010/main" spd="slow" p14:dur="1500">
         <p159:morph option="byWord"/>
       </p:transition>
     </mc:Choice>
-    <mc:Fallback>
+    <mc:Fallback xmlns="">
       <p:transition spd="slow">
         <p:fade/>
       </p:transition>
@@ -16817,13 +17132,7 @@
           </a:p>
           <a:p>
             <a:r>
-              <a:rPr lang="de-DE" strike="sngStrike" dirty="0">
-                <a:solidFill>
-                  <a:schemeClr val="bg1">
-                    <a:lumMod val="50000"/>
-                  </a:schemeClr>
-                </a:solidFill>
-              </a:rPr>
+              <a:rPr lang="de-DE" dirty="0"/>
               <a:t>Wirkungen auf den Menschen</a:t>
             </a:r>
           </a:p>
@@ -16907,6 +17216,221 @@
     </p:spTree>
     <p:extLst>
       <p:ext uri="{BB962C8B-B14F-4D97-AF65-F5344CB8AC3E}">
+        <p14:creationId xmlns:p14="http://schemas.microsoft.com/office/powerpoint/2010/main" val="1666186775"/>
+      </p:ext>
+    </p:extLst>
+  </p:cSld>
+  <p:clrMapOvr>
+    <a:masterClrMapping/>
+  </p:clrMapOvr>
+  <mc:AlternateContent xmlns:mc="http://schemas.openxmlformats.org/markup-compatibility/2006" xmlns:p159="http://schemas.microsoft.com/office/powerpoint/2015/09/main">
+    <mc:Choice Requires="p159">
+      <p:transition xmlns:p14="http://schemas.microsoft.com/office/powerpoint/2010/main" spd="slow" p14:dur="1500">
+        <p159:morph option="byWord"/>
+      </p:transition>
+    </mc:Choice>
+    <mc:Fallback xmlns="">
+      <p:transition spd="slow">
+        <p:fade/>
+      </p:transition>
+    </mc:Fallback>
+  </mc:AlternateContent>
+</p:sld>
+</file>
+
+<file path=ppt/slides/slide26.xml><?xml version="1.0" encoding="utf-8"?>
+<p:sld xmlns:a="http://schemas.openxmlformats.org/drawingml/2006/main" xmlns:r="http://schemas.openxmlformats.org/officeDocument/2006/relationships" xmlns:p="http://schemas.openxmlformats.org/presentationml/2006/main">
+  <p:cSld>
+    <p:spTree>
+      <p:nvGrpSpPr>
+        <p:cNvPr id="1" name=""/>
+        <p:cNvGrpSpPr/>
+        <p:nvPr/>
+      </p:nvGrpSpPr>
+      <p:grpSpPr>
+        <a:xfrm>
+          <a:off x="0" y="0"/>
+          <a:ext cx="0" cy="0"/>
+          <a:chOff x="0" y="0"/>
+          <a:chExt cx="0" cy="0"/>
+        </a:xfrm>
+      </p:grpSpPr>
+      <p:sp>
+        <p:nvSpPr>
+          <p:cNvPr id="10" name="Title 9">
+            <a:extLst>
+              <a:ext uri="{FF2B5EF4-FFF2-40B4-BE49-F238E27FC236}">
+                <a16:creationId xmlns:a16="http://schemas.microsoft.com/office/drawing/2014/main" id="{F5234B45-169E-460C-B432-5FD7C434E42E}"/>
+              </a:ext>
+            </a:extLst>
+          </p:cNvPr>
+          <p:cNvSpPr>
+            <a:spLocks noGrp="1"/>
+          </p:cNvSpPr>
+          <p:nvPr>
+            <p:ph type="title"/>
+          </p:nvPr>
+        </p:nvSpPr>
+        <p:spPr/>
+        <p:txBody>
+          <a:bodyPr/>
+          <a:lstStyle/>
+          <a:p>
+            <a:r>
+              <a:rPr lang="de-DE" dirty="0"/>
+              <a:t>Gliederung</a:t>
+            </a:r>
+          </a:p>
+        </p:txBody>
+      </p:sp>
+      <p:sp>
+        <p:nvSpPr>
+          <p:cNvPr id="11" name="Content Placeholder 10">
+            <a:extLst>
+              <a:ext uri="{FF2B5EF4-FFF2-40B4-BE49-F238E27FC236}">
+                <a16:creationId xmlns:a16="http://schemas.microsoft.com/office/drawing/2014/main" id="{F943316B-60C4-447D-BAA9-CC3020645455}"/>
+              </a:ext>
+            </a:extLst>
+          </p:cNvPr>
+          <p:cNvSpPr>
+            <a:spLocks noGrp="1"/>
+          </p:cNvSpPr>
+          <p:nvPr>
+            <p:ph idx="1"/>
+          </p:nvPr>
+        </p:nvSpPr>
+        <p:spPr/>
+        <p:txBody>
+          <a:bodyPr/>
+          <a:lstStyle/>
+          <a:p>
+            <a:r>
+              <a:rPr lang="de-DE" strike="sngStrike" dirty="0">
+                <a:solidFill>
+                  <a:schemeClr val="bg1">
+                    <a:lumMod val="50000"/>
+                  </a:schemeClr>
+                </a:solidFill>
+              </a:rPr>
+              <a:t>Dosisgrößen</a:t>
+            </a:r>
+          </a:p>
+          <a:p>
+            <a:r>
+              <a:rPr lang="de-DE" strike="sngStrike" dirty="0">
+                <a:solidFill>
+                  <a:schemeClr val="bg1">
+                    <a:lumMod val="50000"/>
+                  </a:schemeClr>
+                </a:solidFill>
+              </a:rPr>
+              <a:t>Eindringen von Strahlung</a:t>
+            </a:r>
+          </a:p>
+          <a:p>
+            <a:r>
+              <a:rPr lang="de-DE" strike="sngStrike" dirty="0">
+                <a:solidFill>
+                  <a:schemeClr val="bg1">
+                    <a:lumMod val="50000"/>
+                  </a:schemeClr>
+                </a:solidFill>
+              </a:rPr>
+              <a:t>Unterscheiden der Auswirkungen</a:t>
+            </a:r>
+          </a:p>
+          <a:p>
+            <a:r>
+              <a:rPr lang="de-DE" strike="sngStrike" dirty="0">
+                <a:solidFill>
+                  <a:schemeClr val="bg1">
+                    <a:lumMod val="50000"/>
+                  </a:schemeClr>
+                </a:solidFill>
+              </a:rPr>
+              <a:t>Wirkungen auf den Menschen</a:t>
+            </a:r>
+          </a:p>
+          <a:p>
+            <a:r>
+              <a:rPr lang="de-DE" dirty="0"/>
+              <a:t>Hormesis</a:t>
+            </a:r>
+          </a:p>
+        </p:txBody>
+      </p:sp>
+      <p:sp>
+        <p:nvSpPr>
+          <p:cNvPr id="4" name="Footer Placeholder 3">
+            <a:extLst>
+              <a:ext uri="{FF2B5EF4-FFF2-40B4-BE49-F238E27FC236}">
+                <a16:creationId xmlns:a16="http://schemas.microsoft.com/office/drawing/2014/main" id="{4FF702D5-0D0F-4728-89CB-AC9BAEF622F7}"/>
+              </a:ext>
+            </a:extLst>
+          </p:cNvPr>
+          <p:cNvSpPr>
+            <a:spLocks noGrp="1"/>
+          </p:cNvSpPr>
+          <p:nvPr>
+            <p:ph type="ftr" sz="quarter" idx="11"/>
+          </p:nvPr>
+        </p:nvSpPr>
+        <p:spPr>
+          <a:xfrm>
+            <a:off x="2482026" y="6356349"/>
+            <a:ext cx="2937810" cy="365125"/>
+          </a:xfrm>
+        </p:spPr>
+        <p:txBody>
+          <a:bodyPr/>
+          <a:lstStyle/>
+          <a:p>
+            <a:r>
+              <a:rPr lang="de-DE"/>
+              <a:t>Die biologischen Wirkungen radioaktiver Strahlung</a:t>
+            </a:r>
+            <a:endParaRPr lang="de-DE" dirty="0"/>
+          </a:p>
+        </p:txBody>
+      </p:sp>
+      <p:sp>
+        <p:nvSpPr>
+          <p:cNvPr id="5" name="Slide Number Placeholder 4">
+            <a:extLst>
+              <a:ext uri="{FF2B5EF4-FFF2-40B4-BE49-F238E27FC236}">
+                <a16:creationId xmlns:a16="http://schemas.microsoft.com/office/drawing/2014/main" id="{8C9FD71D-BBF7-4F35-8676-077BDE3CA819}"/>
+              </a:ext>
+            </a:extLst>
+          </p:cNvPr>
+          <p:cNvSpPr>
+            <a:spLocks noGrp="1"/>
+          </p:cNvSpPr>
+          <p:nvPr>
+            <p:ph type="sldNum" sz="quarter" idx="12"/>
+          </p:nvPr>
+        </p:nvSpPr>
+        <p:spPr>
+          <a:xfrm>
+            <a:off x="5536305" y="6356350"/>
+            <a:ext cx="987552" cy="365125"/>
+          </a:xfrm>
+        </p:spPr>
+        <p:txBody>
+          <a:bodyPr/>
+          <a:lstStyle/>
+          <a:p>
+            <a:fld id="{A49DFD55-3C28-40EF-9E31-A92D2E4017FF}" type="slidenum">
+              <a:rPr lang="en-US" smtClean="0"/>
+              <a:pPr/>
+              <a:t>26</a:t>
+            </a:fld>
+            <a:endParaRPr lang="en-US" dirty="0"/>
+          </a:p>
+        </p:txBody>
+      </p:sp>
+    </p:spTree>
+    <p:extLst>
+      <p:ext uri="{BB962C8B-B14F-4D97-AF65-F5344CB8AC3E}">
         <p14:creationId xmlns:p14="http://schemas.microsoft.com/office/powerpoint/2010/main" val="41588226"/>
       </p:ext>
     </p:extLst>
@@ -16914,13 +17438,13 @@
   <p:clrMapOvr>
     <a:masterClrMapping/>
   </p:clrMapOvr>
-  <mc:AlternateContent xmlns:mc="http://schemas.openxmlformats.org/markup-compatibility/2006">
-    <mc:Choice xmlns:p159="http://schemas.microsoft.com/office/powerpoint/2015/09/main" Requires="p159">
+  <mc:AlternateContent xmlns:mc="http://schemas.openxmlformats.org/markup-compatibility/2006" xmlns:p159="http://schemas.microsoft.com/office/powerpoint/2015/09/main">
+    <mc:Choice Requires="p159">
       <p:transition xmlns:p14="http://schemas.microsoft.com/office/powerpoint/2010/main" spd="slow" p14:dur="1500">
         <p159:morph option="byWord"/>
       </p:transition>
     </mc:Choice>
-    <mc:Fallback>
+    <mc:Fallback xmlns="">
       <p:transition spd="slow">
         <p:fade/>
       </p:transition>
@@ -17058,7 +17582,7 @@
 </p:sld>
 </file>
 
-<file path=ppt/slides/slide26.xml><?xml version="1.0" encoding="utf-8"?>
+<file path=ppt/slides/slide27.xml><?xml version="1.0" encoding="utf-8"?>
 <p:sld xmlns:a="http://schemas.openxmlformats.org/drawingml/2006/main" xmlns:r="http://schemas.openxmlformats.org/officeDocument/2006/relationships" xmlns:p="http://schemas.openxmlformats.org/presentationml/2006/main">
   <p:cSld>
     <p:spTree>
@@ -17122,13 +17646,13 @@
         <p:spPr/>
         <p:txBody>
           <a:bodyPr>
-            <a:normAutofit fontScale="92500"/>
+            <a:normAutofit/>
           </a:bodyPr>
           <a:lstStyle/>
           <a:p>
             <a:r>
               <a:rPr lang="de-DE" dirty="0"/>
-              <a:t>Mögliche (unwahrscheinliche) positive Wirkung</a:t>
+              <a:t>Mögliche positive Wirkung?</a:t>
             </a:r>
           </a:p>
         </p:txBody>
@@ -17143,110 +17667,13 @@
   <p:clrMapOvr>
     <a:masterClrMapping/>
   </p:clrMapOvr>
-  <mc:AlternateContent xmlns:mc="http://schemas.openxmlformats.org/markup-compatibility/2006">
-    <mc:Choice xmlns:p159="http://schemas.microsoft.com/office/powerpoint/2015/09/main" Requires="p159">
+  <mc:AlternateContent xmlns:mc="http://schemas.openxmlformats.org/markup-compatibility/2006" xmlns:p159="http://schemas.microsoft.com/office/powerpoint/2015/09/main">
+    <mc:Choice Requires="p159">
       <p:transition xmlns:p14="http://schemas.microsoft.com/office/powerpoint/2010/main" spd="slow" p14:dur="1500">
         <p159:morph option="byWord"/>
       </p:transition>
     </mc:Choice>
-    <mc:Fallback>
-      <p:transition spd="slow">
-        <p:fade/>
-      </p:transition>
-    </mc:Fallback>
-  </mc:AlternateContent>
-</p:sld>
-</file>
-
-<file path=ppt/slides/slide27.xml><?xml version="1.0" encoding="utf-8"?>
-<p:sld xmlns:a="http://schemas.openxmlformats.org/drawingml/2006/main" xmlns:r="http://schemas.openxmlformats.org/officeDocument/2006/relationships" xmlns:p="http://schemas.openxmlformats.org/presentationml/2006/main">
-  <p:cSld>
-    <p:spTree>
-      <p:nvGrpSpPr>
-        <p:cNvPr id="1" name=""/>
-        <p:cNvGrpSpPr/>
-        <p:nvPr/>
-      </p:nvGrpSpPr>
-      <p:grpSpPr>
-        <a:xfrm>
-          <a:off x="0" y="0"/>
-          <a:ext cx="0" cy="0"/>
-          <a:chOff x="0" y="0"/>
-          <a:chExt cx="0" cy="0"/>
-        </a:xfrm>
-      </p:grpSpPr>
-      <p:sp>
-        <p:nvSpPr>
-          <p:cNvPr id="4" name="Title 3">
-            <a:extLst>
-              <a:ext uri="{FF2B5EF4-FFF2-40B4-BE49-F238E27FC236}">
-                <a16:creationId xmlns:a16="http://schemas.microsoft.com/office/drawing/2014/main" id="{4F09AC6C-00AD-4BB5-9AD3-C5F4C9465FA5}"/>
-              </a:ext>
-            </a:extLst>
-          </p:cNvPr>
-          <p:cNvSpPr>
-            <a:spLocks noGrp="1"/>
-          </p:cNvSpPr>
-          <p:nvPr>
-            <p:ph type="title"/>
-          </p:nvPr>
-        </p:nvSpPr>
-        <p:spPr/>
-        <p:txBody>
-          <a:bodyPr/>
-          <a:lstStyle/>
-          <a:p>
-            <a:endParaRPr lang="de-DE"/>
-          </a:p>
-        </p:txBody>
-      </p:sp>
-      <p:sp>
-        <p:nvSpPr>
-          <p:cNvPr id="6" name="Content Placeholder 5">
-            <a:extLst>
-              <a:ext uri="{FF2B5EF4-FFF2-40B4-BE49-F238E27FC236}">
-                <a16:creationId xmlns:a16="http://schemas.microsoft.com/office/drawing/2014/main" id="{D18E0113-9EEC-44E4-8991-58C715DADCB5}"/>
-              </a:ext>
-            </a:extLst>
-          </p:cNvPr>
-          <p:cNvSpPr>
-            <a:spLocks noGrp="1"/>
-          </p:cNvSpPr>
-          <p:nvPr>
-            <p:ph sz="half" idx="2"/>
-          </p:nvPr>
-        </p:nvSpPr>
-        <p:spPr>
-          <a:xfrm>
-            <a:off x="2933700" y="2468880"/>
-            <a:ext cx="8421688" cy="3363593"/>
-          </a:xfrm>
-        </p:spPr>
-        <p:txBody>
-          <a:bodyPr/>
-          <a:lstStyle/>
-          <a:p>
-            <a:endParaRPr lang="de-DE" dirty="0"/>
-          </a:p>
-        </p:txBody>
-      </p:sp>
-    </p:spTree>
-    <p:extLst>
-      <p:ext uri="{BB962C8B-B14F-4D97-AF65-F5344CB8AC3E}">
-        <p14:creationId xmlns:p14="http://schemas.microsoft.com/office/powerpoint/2010/main" val="1155546740"/>
-      </p:ext>
-    </p:extLst>
-  </p:cSld>
-  <p:clrMapOvr>
-    <a:masterClrMapping/>
-  </p:clrMapOvr>
-  <mc:AlternateContent xmlns:mc="http://schemas.openxmlformats.org/markup-compatibility/2006">
-    <mc:Choice xmlns:p159="http://schemas.microsoft.com/office/powerpoint/2015/09/main" Requires="p159">
-      <p:transition xmlns:p14="http://schemas.microsoft.com/office/powerpoint/2010/main" spd="slow" p14:dur="1500">
-        <p159:morph option="byWord"/>
-      </p:transition>
-    </mc:Choice>
-    <mc:Fallback>
+    <mc:Fallback xmlns="">
       <p:transition spd="slow">
         <p:fade/>
       </p:transition>
@@ -17274,10 +17701,10 @@
       </p:grpSpPr>
       <p:sp>
         <p:nvSpPr>
-          <p:cNvPr id="10" name="Title 9">
-            <a:extLst>
-              <a:ext uri="{FF2B5EF4-FFF2-40B4-BE49-F238E27FC236}">
-                <a16:creationId xmlns:a16="http://schemas.microsoft.com/office/drawing/2014/main" id="{F5234B45-169E-460C-B432-5FD7C434E42E}"/>
+          <p:cNvPr id="4" name="Title 3">
+            <a:extLst>
+              <a:ext uri="{FF2B5EF4-FFF2-40B4-BE49-F238E27FC236}">
+                <a16:creationId xmlns:a16="http://schemas.microsoft.com/office/drawing/2014/main" id="{4F09AC6C-00AD-4BB5-9AD3-C5F4C9465FA5}"/>
               </a:ext>
             </a:extLst>
           </p:cNvPr>
@@ -17288,114 +17715,10 @@
             <p:ph type="title"/>
           </p:nvPr>
         </p:nvSpPr>
-        <p:spPr/>
-        <p:txBody>
-          <a:bodyPr/>
-          <a:lstStyle/>
-          <a:p>
-            <a:r>
-              <a:rPr lang="de-DE" dirty="0"/>
-              <a:t>Gliederung</a:t>
-            </a:r>
-          </a:p>
-        </p:txBody>
-      </p:sp>
-      <p:sp>
-        <p:nvSpPr>
-          <p:cNvPr id="11" name="Content Placeholder 10">
-            <a:extLst>
-              <a:ext uri="{FF2B5EF4-FFF2-40B4-BE49-F238E27FC236}">
-                <a16:creationId xmlns:a16="http://schemas.microsoft.com/office/drawing/2014/main" id="{F943316B-60C4-447D-BAA9-CC3020645455}"/>
-              </a:ext>
-            </a:extLst>
-          </p:cNvPr>
-          <p:cNvSpPr>
-            <a:spLocks noGrp="1"/>
-          </p:cNvSpPr>
-          <p:nvPr>
-            <p:ph idx="1"/>
-          </p:nvPr>
-        </p:nvSpPr>
-        <p:spPr/>
-        <p:txBody>
-          <a:bodyPr/>
-          <a:lstStyle/>
-          <a:p>
-            <a:r>
-              <a:rPr lang="de-DE" strike="sngStrike" dirty="0">
-                <a:solidFill>
-                  <a:schemeClr val="bg1">
-                    <a:lumMod val="50000"/>
-                  </a:schemeClr>
-                </a:solidFill>
-              </a:rPr>
-              <a:t>Dosisgrößen</a:t>
-            </a:r>
-          </a:p>
-          <a:p>
-            <a:r>
-              <a:rPr lang="de-DE" strike="sngStrike" dirty="0">
-                <a:solidFill>
-                  <a:schemeClr val="bg1">
-                    <a:lumMod val="50000"/>
-                  </a:schemeClr>
-                </a:solidFill>
-              </a:rPr>
-              <a:t>Eindringen von Strahlung</a:t>
-            </a:r>
-          </a:p>
-          <a:p>
-            <a:r>
-              <a:rPr lang="de-DE" strike="sngStrike" dirty="0">
-                <a:solidFill>
-                  <a:schemeClr val="bg1">
-                    <a:lumMod val="50000"/>
-                  </a:schemeClr>
-                </a:solidFill>
-              </a:rPr>
-              <a:t>Unterscheiden der Auswirkungen</a:t>
-            </a:r>
-          </a:p>
-          <a:p>
-            <a:r>
-              <a:rPr lang="de-DE" strike="sngStrike" dirty="0">
-                <a:solidFill>
-                  <a:schemeClr val="bg1">
-                    <a:lumMod val="50000"/>
-                  </a:schemeClr>
-                </a:solidFill>
-              </a:rPr>
-              <a:t>Wirkungen auf den Menschen</a:t>
-            </a:r>
-          </a:p>
-          <a:p>
-            <a:r>
-              <a:rPr lang="de-DE" dirty="0"/>
-              <a:t>Hormesis</a:t>
-            </a:r>
-          </a:p>
-        </p:txBody>
-      </p:sp>
-      <p:sp>
-        <p:nvSpPr>
-          <p:cNvPr id="4" name="Footer Placeholder 3">
-            <a:extLst>
-              <a:ext uri="{FF2B5EF4-FFF2-40B4-BE49-F238E27FC236}">
-                <a16:creationId xmlns:a16="http://schemas.microsoft.com/office/drawing/2014/main" id="{4FF702D5-0D0F-4728-89CB-AC9BAEF622F7}"/>
-              </a:ext>
-            </a:extLst>
-          </p:cNvPr>
-          <p:cNvSpPr>
-            <a:spLocks noGrp="1"/>
-          </p:cNvSpPr>
-          <p:nvPr>
-            <p:ph type="ftr" sz="quarter" idx="11"/>
-          </p:nvPr>
-        </p:nvSpPr>
         <p:spPr>
           <a:xfrm>
-            <a:off x="2482026" y="6356349"/>
-            <a:ext cx="2937810" cy="365125"/>
+            <a:off x="1885156" y="2766218"/>
+            <a:ext cx="8421688" cy="1325563"/>
           </a:xfrm>
         </p:spPr>
         <p:txBody>
@@ -17403,65 +17726,29 @@
           <a:lstStyle/>
           <a:p>
             <a:r>
-              <a:rPr lang="de-DE"/>
-              <a:t>Die biologischen Wirkungen radioaktiver Strahlung</a:t>
-            </a:r>
-            <a:endParaRPr lang="de-DE" dirty="0"/>
-          </a:p>
-        </p:txBody>
-      </p:sp>
-      <p:sp>
-        <p:nvSpPr>
-          <p:cNvPr id="5" name="Slide Number Placeholder 4">
-            <a:extLst>
-              <a:ext uri="{FF2B5EF4-FFF2-40B4-BE49-F238E27FC236}">
-                <a16:creationId xmlns:a16="http://schemas.microsoft.com/office/drawing/2014/main" id="{8C9FD71D-BBF7-4F35-8676-077BDE3CA819}"/>
-              </a:ext>
-            </a:extLst>
-          </p:cNvPr>
-          <p:cNvSpPr>
-            <a:spLocks noGrp="1"/>
-          </p:cNvSpPr>
-          <p:nvPr>
-            <p:ph type="sldNum" sz="quarter" idx="12"/>
-          </p:nvPr>
-        </p:nvSpPr>
-        <p:spPr>
-          <a:xfrm>
-            <a:off x="5536305" y="6356350"/>
-            <a:ext cx="987552" cy="365125"/>
-          </a:xfrm>
-        </p:spPr>
-        <p:txBody>
-          <a:bodyPr/>
-          <a:lstStyle/>
-          <a:p>
-            <a:fld id="{A49DFD55-3C28-40EF-9E31-A92D2E4017FF}" type="slidenum">
-              <a:rPr lang="en-US" smtClean="0"/>
-              <a:pPr/>
-              <a:t>28</a:t>
-            </a:fld>
-            <a:endParaRPr lang="en-US" dirty="0"/>
+              <a:rPr lang="de-DE" dirty="0"/>
+              <a:t>Hormesis – Positive Wirkungen?</a:t>
+            </a:r>
           </a:p>
         </p:txBody>
       </p:sp>
     </p:spTree>
     <p:extLst>
       <p:ext uri="{BB962C8B-B14F-4D97-AF65-F5344CB8AC3E}">
-        <p14:creationId xmlns:p14="http://schemas.microsoft.com/office/powerpoint/2010/main" val="2659002007"/>
+        <p14:creationId xmlns:p14="http://schemas.microsoft.com/office/powerpoint/2010/main" val="1155546740"/>
       </p:ext>
     </p:extLst>
   </p:cSld>
   <p:clrMapOvr>
     <a:masterClrMapping/>
   </p:clrMapOvr>
-  <mc:AlternateContent xmlns:mc="http://schemas.openxmlformats.org/markup-compatibility/2006">
-    <mc:Choice xmlns:p159="http://schemas.microsoft.com/office/powerpoint/2015/09/main" Requires="p159">
+  <mc:AlternateContent xmlns:mc="http://schemas.openxmlformats.org/markup-compatibility/2006" xmlns:p159="http://schemas.microsoft.com/office/powerpoint/2015/09/main">
+    <mc:Choice Requires="p159">
       <p:transition xmlns:p14="http://schemas.microsoft.com/office/powerpoint/2010/main" spd="slow" p14:dur="1500">
         <p159:morph option="byWord"/>
       </p:transition>
     </mc:Choice>
-    <mc:Fallback>
+    <mc:Fallback xmlns="">
       <p:transition spd="slow">
         <p:fade/>
       </p:transition>
@@ -17585,13 +17872,7 @@
           </a:p>
           <a:p>
             <a:r>
-              <a:rPr lang="de-DE" strike="sngStrike" dirty="0">
-                <a:solidFill>
-                  <a:schemeClr val="bg1">
-                    <a:lumMod val="50000"/>
-                  </a:schemeClr>
-                </a:solidFill>
-              </a:rPr>
+              <a:rPr lang="de-DE" dirty="0"/>
               <a:t>Hormesis</a:t>
             </a:r>
           </a:p>
@@ -17669,20 +17950,20 @@
     </p:spTree>
     <p:extLst>
       <p:ext uri="{BB962C8B-B14F-4D97-AF65-F5344CB8AC3E}">
-        <p14:creationId xmlns:p14="http://schemas.microsoft.com/office/powerpoint/2010/main" val="4246621462"/>
+        <p14:creationId xmlns:p14="http://schemas.microsoft.com/office/powerpoint/2010/main" val="2659002007"/>
       </p:ext>
     </p:extLst>
   </p:cSld>
   <p:clrMapOvr>
     <a:masterClrMapping/>
   </p:clrMapOvr>
-  <mc:AlternateContent xmlns:mc="http://schemas.openxmlformats.org/markup-compatibility/2006">
-    <mc:Choice xmlns:p159="http://schemas.microsoft.com/office/powerpoint/2015/09/main" Requires="p159">
+  <mc:AlternateContent xmlns:mc="http://schemas.openxmlformats.org/markup-compatibility/2006" xmlns:p159="http://schemas.microsoft.com/office/powerpoint/2015/09/main">
+    <mc:Choice Requires="p159">
       <p:transition xmlns:p14="http://schemas.microsoft.com/office/powerpoint/2010/main" spd="slow" p14:dur="1500">
         <p159:morph option="byWord"/>
       </p:transition>
     </mc:Choice>
-    <mc:Fallback>
+    <mc:Fallback xmlns="">
       <p:transition spd="slow">
         <p:fade/>
       </p:transition>
@@ -17867,13 +18148,13 @@
   <p:clrMapOvr>
     <a:masterClrMapping/>
   </p:clrMapOvr>
-  <mc:AlternateContent xmlns:mc="http://schemas.openxmlformats.org/markup-compatibility/2006">
-    <mc:Choice xmlns:p159="http://schemas.microsoft.com/office/powerpoint/2015/09/main" Requires="p159">
+  <mc:AlternateContent xmlns:mc="http://schemas.openxmlformats.org/markup-compatibility/2006" xmlns:p159="http://schemas.microsoft.com/office/powerpoint/2015/09/main">
+    <mc:Choice Requires="p159">
       <p:transition xmlns:p14="http://schemas.microsoft.com/office/powerpoint/2010/main" spd="slow" p14:dur="1500">
         <p159:morph option="byWord"/>
       </p:transition>
     </mc:Choice>
-    <mc:Fallback>
+    <mc:Fallback xmlns="">
       <p:transition spd="slow">
         <p:fade/>
       </p:transition>
@@ -18030,6 +18311,227 @@
       </p:grpSpPr>
       <p:sp>
         <p:nvSpPr>
+          <p:cNvPr id="10" name="Title 9">
+            <a:extLst>
+              <a:ext uri="{FF2B5EF4-FFF2-40B4-BE49-F238E27FC236}">
+                <a16:creationId xmlns:a16="http://schemas.microsoft.com/office/drawing/2014/main" id="{F5234B45-169E-460C-B432-5FD7C434E42E}"/>
+              </a:ext>
+            </a:extLst>
+          </p:cNvPr>
+          <p:cNvSpPr>
+            <a:spLocks noGrp="1"/>
+          </p:cNvSpPr>
+          <p:nvPr>
+            <p:ph type="title"/>
+          </p:nvPr>
+        </p:nvSpPr>
+        <p:spPr/>
+        <p:txBody>
+          <a:bodyPr/>
+          <a:lstStyle/>
+          <a:p>
+            <a:r>
+              <a:rPr lang="de-DE" dirty="0"/>
+              <a:t>Gliederung</a:t>
+            </a:r>
+          </a:p>
+        </p:txBody>
+      </p:sp>
+      <p:sp>
+        <p:nvSpPr>
+          <p:cNvPr id="11" name="Content Placeholder 10">
+            <a:extLst>
+              <a:ext uri="{FF2B5EF4-FFF2-40B4-BE49-F238E27FC236}">
+                <a16:creationId xmlns:a16="http://schemas.microsoft.com/office/drawing/2014/main" id="{F943316B-60C4-447D-BAA9-CC3020645455}"/>
+              </a:ext>
+            </a:extLst>
+          </p:cNvPr>
+          <p:cNvSpPr>
+            <a:spLocks noGrp="1"/>
+          </p:cNvSpPr>
+          <p:nvPr>
+            <p:ph idx="1"/>
+          </p:nvPr>
+        </p:nvSpPr>
+        <p:spPr/>
+        <p:txBody>
+          <a:bodyPr/>
+          <a:lstStyle/>
+          <a:p>
+            <a:r>
+              <a:rPr lang="de-DE" strike="sngStrike" dirty="0">
+                <a:solidFill>
+                  <a:schemeClr val="bg1">
+                    <a:lumMod val="50000"/>
+                  </a:schemeClr>
+                </a:solidFill>
+              </a:rPr>
+              <a:t>Dosisgrößen</a:t>
+            </a:r>
+          </a:p>
+          <a:p>
+            <a:r>
+              <a:rPr lang="de-DE" strike="sngStrike" dirty="0">
+                <a:solidFill>
+                  <a:schemeClr val="bg1">
+                    <a:lumMod val="50000"/>
+                  </a:schemeClr>
+                </a:solidFill>
+              </a:rPr>
+              <a:t>Eindringen von Strahlung</a:t>
+            </a:r>
+          </a:p>
+          <a:p>
+            <a:r>
+              <a:rPr lang="de-DE" strike="sngStrike" dirty="0">
+                <a:solidFill>
+                  <a:schemeClr val="bg1">
+                    <a:lumMod val="50000"/>
+                  </a:schemeClr>
+                </a:solidFill>
+              </a:rPr>
+              <a:t>Unterscheiden der Auswirkungen</a:t>
+            </a:r>
+          </a:p>
+          <a:p>
+            <a:r>
+              <a:rPr lang="de-DE" strike="sngStrike" dirty="0">
+                <a:solidFill>
+                  <a:schemeClr val="bg1">
+                    <a:lumMod val="50000"/>
+                  </a:schemeClr>
+                </a:solidFill>
+              </a:rPr>
+              <a:t>Wirkungen auf den Menschen</a:t>
+            </a:r>
+          </a:p>
+          <a:p>
+            <a:r>
+              <a:rPr lang="de-DE" strike="sngStrike" dirty="0">
+                <a:solidFill>
+                  <a:schemeClr val="bg1">
+                    <a:lumMod val="50000"/>
+                  </a:schemeClr>
+                </a:solidFill>
+              </a:rPr>
+              <a:t>Hormesis</a:t>
+            </a:r>
+          </a:p>
+        </p:txBody>
+      </p:sp>
+      <p:sp>
+        <p:nvSpPr>
+          <p:cNvPr id="4" name="Footer Placeholder 3">
+            <a:extLst>
+              <a:ext uri="{FF2B5EF4-FFF2-40B4-BE49-F238E27FC236}">
+                <a16:creationId xmlns:a16="http://schemas.microsoft.com/office/drawing/2014/main" id="{4FF702D5-0D0F-4728-89CB-AC9BAEF622F7}"/>
+              </a:ext>
+            </a:extLst>
+          </p:cNvPr>
+          <p:cNvSpPr>
+            <a:spLocks noGrp="1"/>
+          </p:cNvSpPr>
+          <p:nvPr>
+            <p:ph type="ftr" sz="quarter" idx="11"/>
+          </p:nvPr>
+        </p:nvSpPr>
+        <p:spPr>
+          <a:xfrm>
+            <a:off x="2482026" y="6356349"/>
+            <a:ext cx="2937810" cy="365125"/>
+          </a:xfrm>
+        </p:spPr>
+        <p:txBody>
+          <a:bodyPr/>
+          <a:lstStyle/>
+          <a:p>
+            <a:r>
+              <a:rPr lang="de-DE"/>
+              <a:t>Die biologischen Wirkungen radioaktiver Strahlung</a:t>
+            </a:r>
+            <a:endParaRPr lang="de-DE" dirty="0"/>
+          </a:p>
+        </p:txBody>
+      </p:sp>
+      <p:sp>
+        <p:nvSpPr>
+          <p:cNvPr id="5" name="Slide Number Placeholder 4">
+            <a:extLst>
+              <a:ext uri="{FF2B5EF4-FFF2-40B4-BE49-F238E27FC236}">
+                <a16:creationId xmlns:a16="http://schemas.microsoft.com/office/drawing/2014/main" id="{8C9FD71D-BBF7-4F35-8676-077BDE3CA819}"/>
+              </a:ext>
+            </a:extLst>
+          </p:cNvPr>
+          <p:cNvSpPr>
+            <a:spLocks noGrp="1"/>
+          </p:cNvSpPr>
+          <p:nvPr>
+            <p:ph type="sldNum" sz="quarter" idx="12"/>
+          </p:nvPr>
+        </p:nvSpPr>
+        <p:spPr>
+          <a:xfrm>
+            <a:off x="5536305" y="6356350"/>
+            <a:ext cx="987552" cy="365125"/>
+          </a:xfrm>
+        </p:spPr>
+        <p:txBody>
+          <a:bodyPr/>
+          <a:lstStyle/>
+          <a:p>
+            <a:fld id="{A49DFD55-3C28-40EF-9E31-A92D2E4017FF}" type="slidenum">
+              <a:rPr lang="en-US" smtClean="0"/>
+              <a:pPr/>
+              <a:t>30</a:t>
+            </a:fld>
+            <a:endParaRPr lang="en-US" dirty="0"/>
+          </a:p>
+        </p:txBody>
+      </p:sp>
+    </p:spTree>
+    <p:extLst>
+      <p:ext uri="{BB962C8B-B14F-4D97-AF65-F5344CB8AC3E}">
+        <p14:creationId xmlns:p14="http://schemas.microsoft.com/office/powerpoint/2010/main" val="4246621462"/>
+      </p:ext>
+    </p:extLst>
+  </p:cSld>
+  <p:clrMapOvr>
+    <a:masterClrMapping/>
+  </p:clrMapOvr>
+  <mc:AlternateContent xmlns:mc="http://schemas.openxmlformats.org/markup-compatibility/2006" xmlns:p159="http://schemas.microsoft.com/office/powerpoint/2015/09/main">
+    <mc:Choice Requires="p159">
+      <p:transition xmlns:p14="http://schemas.microsoft.com/office/powerpoint/2010/main" spd="slow" p14:dur="1500">
+        <p159:morph option="byWord"/>
+      </p:transition>
+    </mc:Choice>
+    <mc:Fallback xmlns="">
+      <p:transition spd="slow">
+        <p:fade/>
+      </p:transition>
+    </mc:Fallback>
+  </mc:AlternateContent>
+</p:sld>
+</file>
+
+<file path=ppt/slides/slide31.xml><?xml version="1.0" encoding="utf-8"?>
+<p:sld xmlns:a="http://schemas.openxmlformats.org/drawingml/2006/main" xmlns:r="http://schemas.openxmlformats.org/officeDocument/2006/relationships" xmlns:p="http://schemas.openxmlformats.org/presentationml/2006/main">
+  <p:cSld>
+    <p:spTree>
+      <p:nvGrpSpPr>
+        <p:cNvPr id="1" name=""/>
+        <p:cNvGrpSpPr/>
+        <p:nvPr/>
+      </p:nvGrpSpPr>
+      <p:grpSpPr>
+        <a:xfrm>
+          <a:off x="0" y="0"/>
+          <a:ext cx="0" cy="0"/>
+          <a:chOff x="0" y="0"/>
+          <a:chExt cx="0" cy="0"/>
+        </a:xfrm>
+      </p:grpSpPr>
+      <p:sp>
+        <p:nvSpPr>
           <p:cNvPr id="6" name="Title 5">
             <a:extLst>
               <a:ext uri="{FF2B5EF4-FFF2-40B4-BE49-F238E27FC236}">
@@ -18051,35 +18553,7 @@
           <a:p>
             <a:r>
               <a:rPr lang="de-DE" dirty="0"/>
-              <a:t>Danke furs Zuhören!</a:t>
-            </a:r>
-          </a:p>
-        </p:txBody>
-      </p:sp>
-      <p:sp>
-        <p:nvSpPr>
-          <p:cNvPr id="7" name="Subtitle 6">
-            <a:extLst>
-              <a:ext uri="{FF2B5EF4-FFF2-40B4-BE49-F238E27FC236}">
-                <a16:creationId xmlns:a16="http://schemas.microsoft.com/office/drawing/2014/main" id="{25984789-4704-44A3-A160-BB709001E166}"/>
-              </a:ext>
-            </a:extLst>
-          </p:cNvPr>
-          <p:cNvSpPr>
-            <a:spLocks noGrp="1"/>
-          </p:cNvSpPr>
-          <p:nvPr>
-            <p:ph type="subTitle" idx="1"/>
-          </p:nvPr>
-        </p:nvSpPr>
-        <p:spPr/>
-        <p:txBody>
-          <a:bodyPr/>
-          <a:lstStyle/>
-          <a:p>
-            <a:r>
-              <a:rPr lang="de-DE" dirty="0"/>
-              <a:t>Ihr könnt ab jetzt eure Fragen stellen, Feedback geben oder einfach Applaudieren wenn ihr sehr begeistert wart!</a:t>
+              <a:t>Danke fÜrs Zuhören!</a:t>
             </a:r>
           </a:p>
         </p:txBody>
@@ -18094,13 +18568,254 @@
   <p:clrMapOvr>
     <a:masterClrMapping/>
   </p:clrMapOvr>
-  <mc:AlternateContent xmlns:mc="http://schemas.openxmlformats.org/markup-compatibility/2006">
-    <mc:Choice xmlns:p159="http://schemas.microsoft.com/office/powerpoint/2015/09/main" Requires="p159">
+  <mc:AlternateContent xmlns:mc="http://schemas.openxmlformats.org/markup-compatibility/2006" xmlns:p159="http://schemas.microsoft.com/office/powerpoint/2015/09/main">
+    <mc:Choice Requires="p159">
       <p:transition xmlns:p14="http://schemas.microsoft.com/office/powerpoint/2010/main" spd="slow" p14:dur="1500">
         <p159:morph option="byWord"/>
       </p:transition>
     </mc:Choice>
-    <mc:Fallback>
+    <mc:Fallback xmlns="">
+      <p:transition spd="slow">
+        <p:fade/>
+      </p:transition>
+    </mc:Fallback>
+  </mc:AlternateContent>
+</p:sld>
+</file>
+
+<file path=ppt/slides/slide32.xml><?xml version="1.0" encoding="utf-8"?>
+<p:sld xmlns:a="http://schemas.openxmlformats.org/drawingml/2006/main" xmlns:r="http://schemas.openxmlformats.org/officeDocument/2006/relationships" xmlns:p="http://schemas.openxmlformats.org/presentationml/2006/main">
+  <p:cSld>
+    <p:spTree>
+      <p:nvGrpSpPr>
+        <p:cNvPr id="1" name=""/>
+        <p:cNvGrpSpPr/>
+        <p:nvPr/>
+      </p:nvGrpSpPr>
+      <p:grpSpPr>
+        <a:xfrm>
+          <a:off x="0" y="0"/>
+          <a:ext cx="0" cy="0"/>
+          <a:chOff x="0" y="0"/>
+          <a:chExt cx="0" cy="0"/>
+        </a:xfrm>
+      </p:grpSpPr>
+      <p:sp>
+        <p:nvSpPr>
+          <p:cNvPr id="6" name="Title 5">
+            <a:extLst>
+              <a:ext uri="{FF2B5EF4-FFF2-40B4-BE49-F238E27FC236}">
+                <a16:creationId xmlns:a16="http://schemas.microsoft.com/office/drawing/2014/main" id="{9AC1E015-3A28-47A1-B7E5-5698077E8A86}"/>
+              </a:ext>
+            </a:extLst>
+          </p:cNvPr>
+          <p:cNvSpPr>
+            <a:spLocks noGrp="1"/>
+          </p:cNvSpPr>
+          <p:nvPr>
+            <p:ph type="title"/>
+          </p:nvPr>
+        </p:nvSpPr>
+        <p:spPr/>
+        <p:txBody>
+          <a:bodyPr/>
+          <a:lstStyle/>
+          <a:p>
+            <a:r>
+              <a:rPr lang="de-DE" dirty="0"/>
+              <a:t>Quellen</a:t>
+            </a:r>
+          </a:p>
+        </p:txBody>
+      </p:sp>
+      <p:sp>
+        <p:nvSpPr>
+          <p:cNvPr id="12" name="Content Placeholder 11">
+            <a:extLst>
+              <a:ext uri="{FF2B5EF4-FFF2-40B4-BE49-F238E27FC236}">
+                <a16:creationId xmlns:a16="http://schemas.microsoft.com/office/drawing/2014/main" id="{717F1414-034F-4628-94B0-861D5707592D}"/>
+              </a:ext>
+            </a:extLst>
+          </p:cNvPr>
+          <p:cNvSpPr>
+            <a:spLocks noGrp="1"/>
+          </p:cNvSpPr>
+          <p:nvPr>
+            <p:ph sz="half" idx="14"/>
+          </p:nvPr>
+        </p:nvSpPr>
+        <p:spPr>
+          <a:xfrm>
+            <a:off x="1322833" y="2377440"/>
+            <a:ext cx="9626064" cy="3455033"/>
+          </a:xfrm>
+        </p:spPr>
+        <p:txBody>
+          <a:bodyPr/>
+          <a:lstStyle/>
+          <a:p>
+            <a:r>
+              <a:rPr lang="de-DE" dirty="0"/>
+              <a:t>Bildquellen:</a:t>
+            </a:r>
+          </a:p>
+          <a:p>
+            <a:r>
+              <a:rPr lang="de-DE" dirty="0">
+                <a:effectLst/>
+                <a:hlinkClick r:id="rId2"/>
+              </a:rPr>
+              <a:t>https://www.seilnacht.com/Lexikon/rawecker.JPG</a:t>
+            </a:r>
+            <a:endParaRPr lang="de-DE" dirty="0">
+              <a:effectLst/>
+            </a:endParaRPr>
+          </a:p>
+          <a:p>
+            <a:r>
+              <a:rPr lang="de-DE" dirty="0">
+                <a:effectLst/>
+                <a:hlinkClick r:id="rId3"/>
+              </a:rPr>
+              <a:t>https://www.flickr.com/photos/erdwissen/5323191993</a:t>
+            </a:r>
+            <a:endParaRPr lang="de-DE" dirty="0"/>
+          </a:p>
+          <a:p>
+            <a:r>
+              <a:rPr lang="de-DE" dirty="0">
+                <a:effectLst/>
+                <a:hlinkClick r:id="rId4"/>
+              </a:rPr>
+              <a:t>https://cdn.prod.www.spiegel.de/images/96f7bcf6-0001-0004-0000-000000191473_w720_r1.3333333333333333_fpx48.75_fpy55.01.webp</a:t>
+            </a:r>
+            <a:endParaRPr lang="de-DE" dirty="0">
+              <a:effectLst/>
+            </a:endParaRPr>
+          </a:p>
+          <a:p>
+            <a:r>
+              <a:rPr lang="de-DE" dirty="0">
+                <a:effectLst/>
+                <a:hlinkClick r:id="rId5"/>
+              </a:rPr>
+              <a:t>https://www.scinexx.de/news/medizin/strahlung-verursacht-molekuel-explosion/</a:t>
+            </a:r>
+            <a:endParaRPr lang="de-DE" dirty="0"/>
+          </a:p>
+          <a:p>
+            <a:r>
+              <a:rPr lang="de-DE" dirty="0">
+                <a:effectLst/>
+                <a:hlinkClick r:id="rId6"/>
+              </a:rPr>
+              <a:t>https://de.wikipedia.org/wiki/Datei:Doramad_Advertisement.jpg</a:t>
+            </a:r>
+            <a:endParaRPr lang="de-DE" dirty="0"/>
+          </a:p>
+          <a:p>
+            <a:endParaRPr lang="de-DE" dirty="0">
+              <a:effectLst/>
+            </a:endParaRPr>
+          </a:p>
+          <a:p>
+            <a:r>
+              <a:rPr lang="de-DE" dirty="0"/>
+              <a:t>Seminararbeit:</a:t>
+            </a:r>
+          </a:p>
+          <a:p>
+            <a:r>
+              <a:rPr lang="de-DE" dirty="0">
+                <a:hlinkClick r:id="rId7"/>
+              </a:rPr>
+              <a:t>https://github.com/Scriptor25/Seminararbeit</a:t>
+            </a:r>
+            <a:endParaRPr lang="de-DE" dirty="0"/>
+          </a:p>
+          <a:p>
+            <a:endParaRPr lang="de-DE" dirty="0">
+              <a:effectLst/>
+            </a:endParaRPr>
+          </a:p>
+        </p:txBody>
+      </p:sp>
+      <p:sp>
+        <p:nvSpPr>
+          <p:cNvPr id="4" name="Footer Placeholder 3">
+            <a:extLst>
+              <a:ext uri="{FF2B5EF4-FFF2-40B4-BE49-F238E27FC236}">
+                <a16:creationId xmlns:a16="http://schemas.microsoft.com/office/drawing/2014/main" id="{1C56F7D2-ACB7-43B4-816E-770F7295C746}"/>
+              </a:ext>
+            </a:extLst>
+          </p:cNvPr>
+          <p:cNvSpPr>
+            <a:spLocks noGrp="1"/>
+          </p:cNvSpPr>
+          <p:nvPr>
+            <p:ph type="ftr" sz="quarter" idx="11"/>
+          </p:nvPr>
+        </p:nvSpPr>
+        <p:spPr/>
+        <p:txBody>
+          <a:bodyPr/>
+          <a:lstStyle/>
+          <a:p>
+            <a:r>
+              <a:rPr lang="de-DE"/>
+              <a:t>Die biologischen Wirkungen radioaktiver Strahlung</a:t>
+            </a:r>
+            <a:endParaRPr lang="de-DE" dirty="0"/>
+          </a:p>
+        </p:txBody>
+      </p:sp>
+      <p:sp>
+        <p:nvSpPr>
+          <p:cNvPr id="5" name="Slide Number Placeholder 4">
+            <a:extLst>
+              <a:ext uri="{FF2B5EF4-FFF2-40B4-BE49-F238E27FC236}">
+                <a16:creationId xmlns:a16="http://schemas.microsoft.com/office/drawing/2014/main" id="{24DE9E67-AE2A-4E5D-B6BB-8B36B4812457}"/>
+              </a:ext>
+            </a:extLst>
+          </p:cNvPr>
+          <p:cNvSpPr>
+            <a:spLocks noGrp="1"/>
+          </p:cNvSpPr>
+          <p:nvPr>
+            <p:ph type="sldNum" sz="quarter" idx="12"/>
+          </p:nvPr>
+        </p:nvSpPr>
+        <p:spPr/>
+        <p:txBody>
+          <a:bodyPr/>
+          <a:lstStyle/>
+          <a:p>
+            <a:fld id="{A49DFD55-3C28-40EF-9E31-A92D2E4017FF}" type="slidenum">
+              <a:rPr lang="en-US" smtClean="0"/>
+              <a:pPr/>
+              <a:t>32</a:t>
+            </a:fld>
+            <a:endParaRPr lang="en-US" dirty="0"/>
+          </a:p>
+        </p:txBody>
+      </p:sp>
+    </p:spTree>
+    <p:extLst>
+      <p:ext uri="{BB962C8B-B14F-4D97-AF65-F5344CB8AC3E}">
+        <p14:creationId xmlns:p14="http://schemas.microsoft.com/office/powerpoint/2010/main" val="462298997"/>
+      </p:ext>
+    </p:extLst>
+  </p:cSld>
+  <p:clrMapOvr>
+    <a:masterClrMapping/>
+  </p:clrMapOvr>
+  <mc:AlternateContent xmlns:mc="http://schemas.openxmlformats.org/markup-compatibility/2006" xmlns:p159="http://schemas.microsoft.com/office/powerpoint/2015/09/main">
+    <mc:Choice Requires="p159">
+      <p:transition xmlns:p14="http://schemas.microsoft.com/office/powerpoint/2010/main" spd="slow" p14:dur="1500">
+        <p159:morph option="byWord"/>
+      </p:transition>
+    </mc:Choice>
+    <mc:Fallback xmlns="">
       <p:transition spd="slow">
         <p:fade/>
       </p:transition>
@@ -18192,13 +18907,13 @@
   <p:clrMapOvr>
     <a:masterClrMapping/>
   </p:clrMapOvr>
-  <mc:AlternateContent xmlns:mc="http://schemas.openxmlformats.org/markup-compatibility/2006">
-    <mc:Choice xmlns:p159="http://schemas.microsoft.com/office/powerpoint/2015/09/main" Requires="p159">
+  <mc:AlternateContent xmlns:mc="http://schemas.openxmlformats.org/markup-compatibility/2006" xmlns:p159="http://schemas.microsoft.com/office/powerpoint/2015/09/main">
+    <mc:Choice Requires="p159">
       <p:transition xmlns:p14="http://schemas.microsoft.com/office/powerpoint/2010/main" spd="slow" p14:dur="1500">
         <p159:morph option="byWord"/>
       </p:transition>
     </mc:Choice>
-    <mc:Fallback>
+    <mc:Fallback xmlns="">
       <p:transition spd="slow">
         <p:fade/>
       </p:transition>
@@ -18252,8 +18967,8 @@
           </a:p>
         </p:txBody>
       </p:sp>
-      <mc:AlternateContent xmlns:mc="http://schemas.openxmlformats.org/markup-compatibility/2006">
-        <mc:Choice xmlns:a14="http://schemas.microsoft.com/office/drawing/2010/main" Requires="a14">
+      <mc:AlternateContent xmlns:mc="http://schemas.openxmlformats.org/markup-compatibility/2006" xmlns:a14="http://schemas.microsoft.com/office/drawing/2010/main">
+        <mc:Choice Requires="a14">
           <p:sp>
             <p:nvSpPr>
               <p:cNvPr id="18" name="Content Placeholder 17">
@@ -18340,6 +19055,7 @@
                 </a:r>
               </a:p>
               <a:p>
+                <a:pPr/>
                 <a14:m>
                   <m:oMathPara xmlns:m="http://schemas.openxmlformats.org/officeDocument/2006/math">
                     <m:oMathParaPr>
@@ -18484,7 +19200,7 @@
             </p:txBody>
           </p:sp>
         </mc:Choice>
-        <mc:Fallback>
+        <mc:Fallback xmlns="">
           <p:sp>
             <p:nvSpPr>
               <p:cNvPr id="18" name="Content Placeholder 17">
@@ -18538,13 +19254,13 @@
   <p:clrMapOvr>
     <a:masterClrMapping/>
   </p:clrMapOvr>
-  <mc:AlternateContent xmlns:mc="http://schemas.openxmlformats.org/markup-compatibility/2006">
-    <mc:Choice xmlns:p159="http://schemas.microsoft.com/office/powerpoint/2015/09/main" Requires="p159">
+  <mc:AlternateContent xmlns:mc="http://schemas.openxmlformats.org/markup-compatibility/2006" xmlns:p159="http://schemas.microsoft.com/office/powerpoint/2015/09/main">
+    <mc:Choice Requires="p159">
       <p:transition xmlns:p14="http://schemas.microsoft.com/office/powerpoint/2010/main" spd="slow" p14:dur="1500">
         <p159:morph option="byWord"/>
       </p:transition>
     </mc:Choice>
-    <mc:Fallback>
+    <mc:Fallback xmlns="">
       <p:transition spd="slow">
         <p:fade/>
       </p:transition>
@@ -18598,8 +19314,8 @@
           </a:p>
         </p:txBody>
       </p:sp>
-      <mc:AlternateContent xmlns:mc="http://schemas.openxmlformats.org/markup-compatibility/2006">
-        <mc:Choice xmlns:a14="http://schemas.microsoft.com/office/drawing/2010/main" Requires="a14">
+      <mc:AlternateContent xmlns:mc="http://schemas.openxmlformats.org/markup-compatibility/2006" xmlns:a14="http://schemas.microsoft.com/office/drawing/2010/main">
+        <mc:Choice Requires="a14">
           <p:sp>
             <p:nvSpPr>
               <p:cNvPr id="18" name="Content Placeholder 17">
@@ -18656,6 +19372,7 @@
                 </a:r>
               </a:p>
               <a:p>
+                <a:pPr/>
                 <a14:m>
                   <m:oMathPara xmlns:m="http://schemas.openxmlformats.org/officeDocument/2006/math">
                     <m:oMathParaPr>
@@ -18757,7 +19474,7 @@
             </p:txBody>
           </p:sp>
         </mc:Choice>
-        <mc:Fallback>
+        <mc:Fallback xmlns="">
           <p:sp>
             <p:nvSpPr>
               <p:cNvPr id="18" name="Content Placeholder 17">
@@ -18811,13 +19528,13 @@
   <p:clrMapOvr>
     <a:masterClrMapping/>
   </p:clrMapOvr>
-  <mc:AlternateContent xmlns:mc="http://schemas.openxmlformats.org/markup-compatibility/2006">
-    <mc:Choice xmlns:p159="http://schemas.microsoft.com/office/powerpoint/2015/09/main" Requires="p159">
+  <mc:AlternateContent xmlns:mc="http://schemas.openxmlformats.org/markup-compatibility/2006" xmlns:p159="http://schemas.microsoft.com/office/powerpoint/2015/09/main">
+    <mc:Choice Requires="p159">
       <p:transition xmlns:p14="http://schemas.microsoft.com/office/powerpoint/2010/main" spd="slow" p14:dur="1500">
         <p159:morph option="byWord"/>
       </p:transition>
     </mc:Choice>
-    <mc:Fallback>
+    <mc:Fallback xmlns="">
       <p:transition spd="slow">
         <p:fade/>
       </p:transition>
@@ -18871,8 +19588,8 @@
           </a:p>
         </p:txBody>
       </p:sp>
-      <mc:AlternateContent xmlns:mc="http://schemas.openxmlformats.org/markup-compatibility/2006">
-        <mc:Choice xmlns:a14="http://schemas.microsoft.com/office/drawing/2010/main" Requires="a14">
+      <mc:AlternateContent xmlns:mc="http://schemas.openxmlformats.org/markup-compatibility/2006" xmlns:a14="http://schemas.microsoft.com/office/drawing/2010/main">
+        <mc:Choice Requires="a14">
           <p:sp>
             <p:nvSpPr>
               <p:cNvPr id="18" name="Content Placeholder 17">
@@ -18939,6 +19656,7 @@
                 </a:r>
               </a:p>
               <a:p>
+                <a:pPr/>
                 <a14:m>
                   <m:oMathPara xmlns:m="http://schemas.openxmlformats.org/officeDocument/2006/math">
                     <m:oMathParaPr>
@@ -19078,6 +19796,7 @@
                 <a:endParaRPr lang="de-DE" dirty="0"/>
               </a:p>
               <a:p>
+                <a:pPr/>
                 <a14:m>
                   <m:oMathPara xmlns:m="http://schemas.openxmlformats.org/officeDocument/2006/math">
                     <m:oMathParaPr>
@@ -19284,7 +20003,7 @@
             </p:txBody>
           </p:sp>
         </mc:Choice>
-        <mc:Fallback>
+        <mc:Fallback xmlns="">
           <p:sp>
             <p:nvSpPr>
               <p:cNvPr id="18" name="Content Placeholder 17">
@@ -19338,13 +20057,13 @@
   <p:clrMapOvr>
     <a:masterClrMapping/>
   </p:clrMapOvr>
-  <mc:AlternateContent xmlns:mc="http://schemas.openxmlformats.org/markup-compatibility/2006">
-    <mc:Choice xmlns:p159="http://schemas.microsoft.com/office/powerpoint/2015/09/main" Requires="p159">
+  <mc:AlternateContent xmlns:mc="http://schemas.openxmlformats.org/markup-compatibility/2006" xmlns:p159="http://schemas.microsoft.com/office/powerpoint/2015/09/main">
+    <mc:Choice Requires="p159">
       <p:transition xmlns:p14="http://schemas.microsoft.com/office/powerpoint/2010/main" spd="slow" p14:dur="1500">
         <p159:morph option="byWord"/>
       </p:transition>
     </mc:Choice>
-    <mc:Fallback>
+    <mc:Fallback xmlns="">
       <p:transition spd="slow">
         <p:fade/>
       </p:transition>
@@ -19398,8 +20117,8 @@
           </a:p>
         </p:txBody>
       </p:sp>
-      <mc:AlternateContent xmlns:mc="http://schemas.openxmlformats.org/markup-compatibility/2006">
-        <mc:Choice xmlns:a14="http://schemas.microsoft.com/office/drawing/2010/main" Requires="a14">
+      <mc:AlternateContent xmlns:mc="http://schemas.openxmlformats.org/markup-compatibility/2006" xmlns:a14="http://schemas.microsoft.com/office/drawing/2010/main">
+        <mc:Choice Requires="a14">
           <p:sp>
             <p:nvSpPr>
               <p:cNvPr id="18" name="Content Placeholder 17">
@@ -19564,7 +20283,7 @@
             </p:txBody>
           </p:sp>
         </mc:Choice>
-        <mc:Fallback>
+        <mc:Fallback xmlns="">
           <p:sp>
             <p:nvSpPr>
               <p:cNvPr id="18" name="Content Placeholder 17">
@@ -19618,13 +20337,13 @@
   <p:clrMapOvr>
     <a:masterClrMapping/>
   </p:clrMapOvr>
-  <mc:AlternateContent xmlns:mc="http://schemas.openxmlformats.org/markup-compatibility/2006">
-    <mc:Choice xmlns:p159="http://schemas.microsoft.com/office/powerpoint/2015/09/main" Requires="p159">
+  <mc:AlternateContent xmlns:mc="http://schemas.openxmlformats.org/markup-compatibility/2006" xmlns:p159="http://schemas.microsoft.com/office/powerpoint/2015/09/main">
+    <mc:Choice Requires="p159">
       <p:transition xmlns:p14="http://schemas.microsoft.com/office/powerpoint/2010/main" spd="slow" p14:dur="1500">
         <p159:morph option="byWord"/>
       </p:transition>
     </mc:Choice>
-    <mc:Fallback>
+    <mc:Fallback xmlns="">
       <p:transition spd="slow">
         <p:fade/>
       </p:transition>
@@ -19678,8 +20397,8 @@
           </a:p>
         </p:txBody>
       </p:sp>
-      <mc:AlternateContent xmlns:mc="http://schemas.openxmlformats.org/markup-compatibility/2006">
-        <mc:Choice xmlns:a14="http://schemas.microsoft.com/office/drawing/2010/main" Requires="a14">
+      <mc:AlternateContent xmlns:mc="http://schemas.openxmlformats.org/markup-compatibility/2006" xmlns:a14="http://schemas.microsoft.com/office/drawing/2010/main">
+        <mc:Choice Requires="a14">
           <p:sp>
             <p:nvSpPr>
               <p:cNvPr id="18" name="Content Placeholder 17">
@@ -19736,6 +20455,7 @@
                 </a:r>
               </a:p>
               <a:p>
+                <a:pPr/>
                 <a14:m>
                   <m:oMathPara xmlns:m="http://schemas.openxmlformats.org/officeDocument/2006/math">
                     <m:oMathParaPr>
@@ -19883,7 +20603,7 @@
             </p:txBody>
           </p:sp>
         </mc:Choice>
-        <mc:Fallback>
+        <mc:Fallback xmlns="">
           <p:sp>
             <p:nvSpPr>
               <p:cNvPr id="18" name="Content Placeholder 17">
@@ -19937,13 +20657,13 @@
   <p:clrMapOvr>
     <a:masterClrMapping/>
   </p:clrMapOvr>
-  <mc:AlternateContent xmlns:mc="http://schemas.openxmlformats.org/markup-compatibility/2006">
-    <mc:Choice xmlns:p159="http://schemas.microsoft.com/office/powerpoint/2015/09/main" Requires="p159">
+  <mc:AlternateContent xmlns:mc="http://schemas.openxmlformats.org/markup-compatibility/2006" xmlns:p159="http://schemas.microsoft.com/office/powerpoint/2015/09/main">
+    <mc:Choice Requires="p159">
       <p:transition xmlns:p14="http://schemas.microsoft.com/office/powerpoint/2010/main" spd="slow" p14:dur="1500">
         <p159:morph option="byWord"/>
       </p:transition>
     </mc:Choice>
-    <mc:Fallback>
+    <mc:Fallback xmlns="">
       <p:transition spd="slow">
         <p:fade/>
       </p:transition>
@@ -20744,6 +21464,35 @@
 </file>
 
 <file path=customXml/item1.xml><?xml version="1.0" encoding="utf-8"?>
+<?mso-contentType ?>
+<FormTemplates xmlns="http://schemas.microsoft.com/sharepoint/v3/contenttype/forms">
+  <Display>DocumentLibraryForm</Display>
+  <Edit>DocumentLibraryForm</Edit>
+  <New>DocumentLibraryForm</New>
+</FormTemplates>
+</file>
+
+<file path=customXml/item2.xml><?xml version="1.0" encoding="utf-8"?>
+<p:properties xmlns:p="http://schemas.microsoft.com/office/2006/metadata/properties" xmlns:xsi="http://www.w3.org/2001/XMLSchema-instance" xmlns:pc="http://schemas.microsoft.com/office/infopath/2007/PartnerControls">
+  <documentManagement>
+    <_ip_UnifiedCompliancePolicyUIAction xmlns="http://schemas.microsoft.com/sharepoint/v3" xsi:nil="true"/>
+    <Image xmlns="71af3243-3dd4-4a8d-8c0d-dd76da1f02a5">
+      <Url xsi:nil="true"/>
+      <Description xsi:nil="true"/>
+    </Image>
+    <Status xmlns="71af3243-3dd4-4a8d-8c0d-dd76da1f02a5">Not started</Status>
+    <_ip_UnifiedCompliancePolicyProperties xmlns="http://schemas.microsoft.com/sharepoint/v3" xsi:nil="true"/>
+    <ImageTagsTaxHTField xmlns="71af3243-3dd4-4a8d-8c0d-dd76da1f02a5">
+      <Terms xmlns="http://schemas.microsoft.com/office/infopath/2007/PartnerControls"/>
+    </ImageTagsTaxHTField>
+    <TaxCatchAll xmlns="230e9df3-be65-4c73-a93b-d1236ebd677e" xsi:nil="true"/>
+    <MediaServiceKeyPoints xmlns="71af3243-3dd4-4a8d-8c0d-dd76da1f02a5" xsi:nil="true"/>
+    <Background xmlns="71af3243-3dd4-4a8d-8c0d-dd76da1f02a5">false</Background>
+  </documentManagement>
+</p:properties>
+</file>
+
+<file path=customXml/item3.xml><?xml version="1.0" encoding="utf-8"?>
 <ct:contentTypeSchema xmlns:ct="http://schemas.microsoft.com/office/2006/metadata/contentType" xmlns:ma="http://schemas.microsoft.com/office/2006/metadata/properties/metaAttributes" ct:_="" ma:_="" ma:contentTypeName="Document" ma:contentTypeID="0x01010079F111ED35F8CC479449609E8A0923A6" ma:contentTypeVersion="28" ma:contentTypeDescription="Create a new document." ma:contentTypeScope="" ma:versionID="60f5a4f2d2b0abadcf532d48ebf9cb71">
   <xsd:schema xmlns:xsd="http://www.w3.org/2001/XMLSchema" xmlns:xs="http://www.w3.org/2001/XMLSchema" xmlns:p="http://schemas.microsoft.com/office/2006/metadata/properties" xmlns:ns1="http://schemas.microsoft.com/sharepoint/v3" xmlns:ns2="71af3243-3dd4-4a8d-8c0d-dd76da1f02a5" xmlns:ns3="16c05727-aa75-4e4a-9b5f-8a80a1165891" xmlns:ns4="230e9df3-be65-4c73-a93b-d1236ebd677e" targetNamespace="http://schemas.microsoft.com/office/2006/metadata/properties" ma:root="true" ma:fieldsID="7dd78129e6a1811f84807ad11c651531" ns1:_="" ns2:_="" ns3:_="" ns4:_="">
     <xsd:import namespace="http://schemas.microsoft.com/sharepoint/v3"/>
@@ -21055,36 +21804,27 @@
 </ct:contentTypeSchema>
 </file>
 
-<file path=customXml/item2.xml><?xml version="1.0" encoding="utf-8"?>
-<?mso-contentType ?>
-<FormTemplates xmlns="http://schemas.microsoft.com/sharepoint/v3/contenttype/forms">
-  <Display>DocumentLibraryForm</Display>
-  <Edit>DocumentLibraryForm</Edit>
-  <New>DocumentLibraryForm</New>
-</FormTemplates>
+<file path=customXml/itemProps1.xml><?xml version="1.0" encoding="utf-8"?>
+<ds:datastoreItem xmlns:ds="http://schemas.openxmlformats.org/officeDocument/2006/customXml" ds:itemID="{BD5826B4-4DD2-4A9B-8D6D-E91CF9C2316C}">
+  <ds:schemaRefs>
+    <ds:schemaRef ds:uri="http://schemas.microsoft.com/sharepoint/v3/contenttype/forms"/>
+  </ds:schemaRefs>
+</ds:datastoreItem>
 </file>
 
-<file path=customXml/item3.xml><?xml version="1.0" encoding="utf-8"?>
-<p:properties xmlns:p="http://schemas.microsoft.com/office/2006/metadata/properties" xmlns:xsi="http://www.w3.org/2001/XMLSchema-instance" xmlns:pc="http://schemas.microsoft.com/office/infopath/2007/PartnerControls">
-  <documentManagement>
-    <_ip_UnifiedCompliancePolicyUIAction xmlns="http://schemas.microsoft.com/sharepoint/v3" xsi:nil="true"/>
-    <Image xmlns="71af3243-3dd4-4a8d-8c0d-dd76da1f02a5">
-      <Url xsi:nil="true"/>
-      <Description xsi:nil="true"/>
-    </Image>
-    <Status xmlns="71af3243-3dd4-4a8d-8c0d-dd76da1f02a5">Not started</Status>
-    <_ip_UnifiedCompliancePolicyProperties xmlns="http://schemas.microsoft.com/sharepoint/v3" xsi:nil="true"/>
-    <ImageTagsTaxHTField xmlns="71af3243-3dd4-4a8d-8c0d-dd76da1f02a5">
-      <Terms xmlns="http://schemas.microsoft.com/office/infopath/2007/PartnerControls"/>
-    </ImageTagsTaxHTField>
-    <TaxCatchAll xmlns="230e9df3-be65-4c73-a93b-d1236ebd677e" xsi:nil="true"/>
-    <MediaServiceKeyPoints xmlns="71af3243-3dd4-4a8d-8c0d-dd76da1f02a5" xsi:nil="true"/>
-    <Background xmlns="71af3243-3dd4-4a8d-8c0d-dd76da1f02a5">false</Background>
-  </documentManagement>
-</p:properties>
+<file path=customXml/itemProps2.xml><?xml version="1.0" encoding="utf-8"?>
+<ds:datastoreItem xmlns:ds="http://schemas.openxmlformats.org/officeDocument/2006/customXml" ds:itemID="{4CC7F809-A434-4A8D-A127-1C50C2DB3890}">
+  <ds:schemaRefs>
+    <ds:schemaRef ds:uri="http://schemas.microsoft.com/office/2006/metadata/properties"/>
+    <ds:schemaRef ds:uri="http://schemas.microsoft.com/office/infopath/2007/PartnerControls"/>
+    <ds:schemaRef ds:uri="http://schemas.microsoft.com/sharepoint/v3"/>
+    <ds:schemaRef ds:uri="71af3243-3dd4-4a8d-8c0d-dd76da1f02a5"/>
+    <ds:schemaRef ds:uri="230e9df3-be65-4c73-a93b-d1236ebd677e"/>
+  </ds:schemaRefs>
+</ds:datastoreItem>
 </file>
 
-<file path=customXml/itemProps1.xml><?xml version="1.0" encoding="utf-8"?>
+<file path=customXml/itemProps3.xml><?xml version="1.0" encoding="utf-8"?>
 <ds:datastoreItem xmlns:ds="http://schemas.openxmlformats.org/officeDocument/2006/customXml" ds:itemID="{00E6EE1E-660B-46C6-AC21-8E505FB9574F}">
   <ds:schemaRefs>
     <ds:schemaRef ds:uri="http://schemas.microsoft.com/office/2006/metadata/contentType"/>
@@ -21105,26 +21845,6 @@
 </ds:datastoreItem>
 </file>
 
-<file path=customXml/itemProps2.xml><?xml version="1.0" encoding="utf-8"?>
-<ds:datastoreItem xmlns:ds="http://schemas.openxmlformats.org/officeDocument/2006/customXml" ds:itemID="{BD5826B4-4DD2-4A9B-8D6D-E91CF9C2316C}">
-  <ds:schemaRefs>
-    <ds:schemaRef ds:uri="http://schemas.microsoft.com/sharepoint/v3/contenttype/forms"/>
-  </ds:schemaRefs>
-</ds:datastoreItem>
-</file>
-
-<file path=customXml/itemProps3.xml><?xml version="1.0" encoding="utf-8"?>
-<ds:datastoreItem xmlns:ds="http://schemas.openxmlformats.org/officeDocument/2006/customXml" ds:itemID="{4CC7F809-A434-4A8D-A127-1C50C2DB3890}">
-  <ds:schemaRefs>
-    <ds:schemaRef ds:uri="http://schemas.microsoft.com/office/2006/metadata/properties"/>
-    <ds:schemaRef ds:uri="http://schemas.microsoft.com/office/infopath/2007/PartnerControls"/>
-    <ds:schemaRef ds:uri="http://schemas.microsoft.com/sharepoint/v3"/>
-    <ds:schemaRef ds:uri="71af3243-3dd4-4a8d-8c0d-dd76da1f02a5"/>
-    <ds:schemaRef ds:uri="230e9df3-be65-4c73-a93b-d1236ebd677e"/>
-  </ds:schemaRefs>
-</ds:datastoreItem>
-</file>
-
 <file path=docMetadata/LabelInfo.xml><?xml version="1.0" encoding="utf-8"?>
 <clbl:labelList xmlns:clbl="http://schemas.microsoft.com/office/2020/mipLabelMetadata"/>
 </file>
</xml_diff>